<commit_message>
Ajustes no Lean UX
</commit_message>
<xml_diff>
--- a/Projeto SIX MIND/Documentação/Lean UX Canva.pptx
+++ b/Projeto SIX MIND/Documentação/Lean UX Canva.pptx
@@ -107,6 +107,11 @@
       </a:defRPr>
     </a:lvl9pPr>
   </p:defaultTextStyle>
+  <p:extLst>
+    <p:ext uri="{EFAFB233-063F-42B5-8137-9DF3F51BA10A}">
+      <p15:sldGuideLst xmlns:p15="http://schemas.microsoft.com/office/powerpoint/2012/main"/>
+    </p:ext>
+  </p:extLst>
 </p:presentation>
 </file>
 
@@ -241,7 +246,7 @@
           <a:p>
             <a:fld id="{3C9368B5-4CE7-416F-948F-D4F1A6F6C364}" type="datetimeFigureOut">
               <a:rPr lang="pt-BR" smtClean="0"/>
-              <a:t>24/08/2020</a:t>
+              <a:t>29/08/2020</a:t>
             </a:fld>
             <a:endParaRPr lang="pt-BR"/>
           </a:p>
@@ -411,7 +416,7 @@
           <a:p>
             <a:fld id="{3C9368B5-4CE7-416F-948F-D4F1A6F6C364}" type="datetimeFigureOut">
               <a:rPr lang="pt-BR" smtClean="0"/>
-              <a:t>24/08/2020</a:t>
+              <a:t>29/08/2020</a:t>
             </a:fld>
             <a:endParaRPr lang="pt-BR"/>
           </a:p>
@@ -591,7 +596,7 @@
           <a:p>
             <a:fld id="{3C9368B5-4CE7-416F-948F-D4F1A6F6C364}" type="datetimeFigureOut">
               <a:rPr lang="pt-BR" smtClean="0"/>
-              <a:t>24/08/2020</a:t>
+              <a:t>29/08/2020</a:t>
             </a:fld>
             <a:endParaRPr lang="pt-BR"/>
           </a:p>
@@ -761,7 +766,7 @@
           <a:p>
             <a:fld id="{3C9368B5-4CE7-416F-948F-D4F1A6F6C364}" type="datetimeFigureOut">
               <a:rPr lang="pt-BR" smtClean="0"/>
-              <a:t>24/08/2020</a:t>
+              <a:t>29/08/2020</a:t>
             </a:fld>
             <a:endParaRPr lang="pt-BR"/>
           </a:p>
@@ -1007,7 +1012,7 @@
           <a:p>
             <a:fld id="{3C9368B5-4CE7-416F-948F-D4F1A6F6C364}" type="datetimeFigureOut">
               <a:rPr lang="pt-BR" smtClean="0"/>
-              <a:t>24/08/2020</a:t>
+              <a:t>29/08/2020</a:t>
             </a:fld>
             <a:endParaRPr lang="pt-BR"/>
           </a:p>
@@ -1239,7 +1244,7 @@
           <a:p>
             <a:fld id="{3C9368B5-4CE7-416F-948F-D4F1A6F6C364}" type="datetimeFigureOut">
               <a:rPr lang="pt-BR" smtClean="0"/>
-              <a:t>24/08/2020</a:t>
+              <a:t>29/08/2020</a:t>
             </a:fld>
             <a:endParaRPr lang="pt-BR"/>
           </a:p>
@@ -1606,7 +1611,7 @@
           <a:p>
             <a:fld id="{3C9368B5-4CE7-416F-948F-D4F1A6F6C364}" type="datetimeFigureOut">
               <a:rPr lang="pt-BR" smtClean="0"/>
-              <a:t>24/08/2020</a:t>
+              <a:t>29/08/2020</a:t>
             </a:fld>
             <a:endParaRPr lang="pt-BR"/>
           </a:p>
@@ -1724,7 +1729,7 @@
           <a:p>
             <a:fld id="{3C9368B5-4CE7-416F-948F-D4F1A6F6C364}" type="datetimeFigureOut">
               <a:rPr lang="pt-BR" smtClean="0"/>
-              <a:t>24/08/2020</a:t>
+              <a:t>29/08/2020</a:t>
             </a:fld>
             <a:endParaRPr lang="pt-BR"/>
           </a:p>
@@ -1819,7 +1824,7 @@
           <a:p>
             <a:fld id="{3C9368B5-4CE7-416F-948F-D4F1A6F6C364}" type="datetimeFigureOut">
               <a:rPr lang="pt-BR" smtClean="0"/>
-              <a:t>24/08/2020</a:t>
+              <a:t>29/08/2020</a:t>
             </a:fld>
             <a:endParaRPr lang="pt-BR"/>
           </a:p>
@@ -2096,7 +2101,7 @@
           <a:p>
             <a:fld id="{3C9368B5-4CE7-416F-948F-D4F1A6F6C364}" type="datetimeFigureOut">
               <a:rPr lang="pt-BR" smtClean="0"/>
-              <a:t>24/08/2020</a:t>
+              <a:t>29/08/2020</a:t>
             </a:fld>
             <a:endParaRPr lang="pt-BR"/>
           </a:p>
@@ -2349,7 +2354,7 @@
           <a:p>
             <a:fld id="{3C9368B5-4CE7-416F-948F-D4F1A6F6C364}" type="datetimeFigureOut">
               <a:rPr lang="pt-BR" smtClean="0"/>
-              <a:t>24/08/2020</a:t>
+              <a:t>29/08/2020</a:t>
             </a:fld>
             <a:endParaRPr lang="pt-BR"/>
           </a:p>
@@ -2562,7 +2567,7 @@
           <a:p>
             <a:fld id="{3C9368B5-4CE7-416F-948F-D4F1A6F6C364}" type="datetimeFigureOut">
               <a:rPr lang="pt-BR" smtClean="0"/>
-              <a:t>24/08/2020</a:t>
+              <a:t>29/08/2020</a:t>
             </a:fld>
             <a:endParaRPr lang="pt-BR"/>
           </a:p>
@@ -4567,26 +4572,14 @@
           <a:bodyPr/>
           <a:lstStyle/>
           <a:p>
-            <a:endParaRPr lang="pt-BR"/>
-          </a:p>
-        </p:txBody>
-      </p:sp>
-      <p:sp>
-        <p:nvSpPr>
-          <p:cNvPr id="3" name="Subtítulo 2"/>
-          <p:cNvSpPr>
-            <a:spLocks noGrp="1"/>
-          </p:cNvSpPr>
-          <p:nvPr>
-            <p:ph type="subTitle" idx="1"/>
-          </p:nvPr>
-        </p:nvSpPr>
-        <p:spPr/>
-        <p:txBody>
-          <a:bodyPr/>
-          <a:lstStyle/>
-          <a:p>
-            <a:endParaRPr lang="pt-BR"/>
+            <a:r>
+              <a:rPr lang="pt-BR" dirty="0" smtClean="0"/>
+              <a:t/>
+            </a:r>
+            <a:br>
+              <a:rPr lang="pt-BR" dirty="0" smtClean="0"/>
+            </a:br>
+            <a:endParaRPr lang="pt-BR" dirty="0"/>
           </a:p>
         </p:txBody>
       </p:sp>
@@ -6271,44 +6264,6 @@
       </p:grpSpPr>
       <p:sp>
         <p:nvSpPr>
-          <p:cNvPr id="2" name="Título 1"/>
-          <p:cNvSpPr>
-            <a:spLocks noGrp="1"/>
-          </p:cNvSpPr>
-          <p:nvPr>
-            <p:ph type="ctrTitle"/>
-          </p:nvPr>
-        </p:nvSpPr>
-        <p:spPr/>
-        <p:txBody>
-          <a:bodyPr/>
-          <a:lstStyle/>
-          <a:p>
-            <a:endParaRPr lang="pt-BR"/>
-          </a:p>
-        </p:txBody>
-      </p:sp>
-      <p:sp>
-        <p:nvSpPr>
-          <p:cNvPr id="3" name="Subtítulo 2"/>
-          <p:cNvSpPr>
-            <a:spLocks noGrp="1"/>
-          </p:cNvSpPr>
-          <p:nvPr>
-            <p:ph type="subTitle" idx="1"/>
-          </p:nvPr>
-        </p:nvSpPr>
-        <p:spPr/>
-        <p:txBody>
-          <a:bodyPr/>
-          <a:lstStyle/>
-          <a:p>
-            <a:endParaRPr lang="pt-BR"/>
-          </a:p>
-        </p:txBody>
-      </p:sp>
-      <p:sp>
-        <p:nvSpPr>
           <p:cNvPr id="6" name="Retângulo 5"/>
           <p:cNvSpPr/>
           <p:nvPr/>
@@ -7328,15 +7283,7 @@
                   <a:schemeClr val="bg1"/>
                 </a:solidFill>
               </a:rPr>
-              <a:t>Previs</a:t>
-            </a:r>
-            <a:r>
-              <a:rPr lang="pt-BR" b="1" dirty="0" smtClean="0">
-                <a:solidFill>
-                  <a:schemeClr val="bg1"/>
-                </a:solidFill>
-              </a:rPr>
-              <a:t>ão Climática</a:t>
+              <a:t>Previsão Climática</a:t>
             </a:r>
             <a:endParaRPr lang="pt-BR" b="1" dirty="0">
               <a:solidFill>
@@ -7754,44 +7701,6 @@
           <a:chExt cx="0" cy="0"/>
         </a:xfrm>
       </p:grpSpPr>
-      <p:sp>
-        <p:nvSpPr>
-          <p:cNvPr id="2" name="Título 1"/>
-          <p:cNvSpPr>
-            <a:spLocks noGrp="1"/>
-          </p:cNvSpPr>
-          <p:nvPr>
-            <p:ph type="ctrTitle"/>
-          </p:nvPr>
-        </p:nvSpPr>
-        <p:spPr/>
-        <p:txBody>
-          <a:bodyPr/>
-          <a:lstStyle/>
-          <a:p>
-            <a:endParaRPr lang="pt-BR"/>
-          </a:p>
-        </p:txBody>
-      </p:sp>
-      <p:sp>
-        <p:nvSpPr>
-          <p:cNvPr id="3" name="Subtítulo 2"/>
-          <p:cNvSpPr>
-            <a:spLocks noGrp="1"/>
-          </p:cNvSpPr>
-          <p:nvPr>
-            <p:ph type="subTitle" idx="1"/>
-          </p:nvPr>
-        </p:nvSpPr>
-        <p:spPr/>
-        <p:txBody>
-          <a:bodyPr/>
-          <a:lstStyle/>
-          <a:p>
-            <a:endParaRPr lang="pt-BR"/>
-          </a:p>
-        </p:txBody>
-      </p:sp>
       <p:sp>
         <p:nvSpPr>
           <p:cNvPr id="6" name="Retângulo 5"/>

</xml_diff>

<commit_message>
mudança para revisão do lean ux
</commit_message>
<xml_diff>
--- a/Projeto SIX MIND/Documentação/Lean UX Canva.pptx
+++ b/Projeto SIX MIND/Documentação/Lean UX Canva.pptx
@@ -9,6 +9,10 @@
     <p:sldId id="257" r:id="rId3"/>
     <p:sldId id="258" r:id="rId4"/>
     <p:sldId id="259" r:id="rId5"/>
+    <p:sldId id="261" r:id="rId6"/>
+    <p:sldId id="260" r:id="rId7"/>
+    <p:sldId id="263" r:id="rId8"/>
+    <p:sldId id="262" r:id="rId9"/>
   </p:sldIdLst>
   <p:sldSz cx="12192000" cy="6858000"/>
   <p:notesSz cx="6858000" cy="9144000"/>
@@ -246,7 +250,7 @@
           <a:p>
             <a:fld id="{3C9368B5-4CE7-416F-948F-D4F1A6F6C364}" type="datetimeFigureOut">
               <a:rPr lang="pt-BR" smtClean="0"/>
-              <a:t>29/08/2020</a:t>
+              <a:t>07/09/2020</a:t>
             </a:fld>
             <a:endParaRPr lang="pt-BR"/>
           </a:p>
@@ -416,7 +420,7 @@
           <a:p>
             <a:fld id="{3C9368B5-4CE7-416F-948F-D4F1A6F6C364}" type="datetimeFigureOut">
               <a:rPr lang="pt-BR" smtClean="0"/>
-              <a:t>29/08/2020</a:t>
+              <a:t>07/09/2020</a:t>
             </a:fld>
             <a:endParaRPr lang="pt-BR"/>
           </a:p>
@@ -596,7 +600,7 @@
           <a:p>
             <a:fld id="{3C9368B5-4CE7-416F-948F-D4F1A6F6C364}" type="datetimeFigureOut">
               <a:rPr lang="pt-BR" smtClean="0"/>
-              <a:t>29/08/2020</a:t>
+              <a:t>07/09/2020</a:t>
             </a:fld>
             <a:endParaRPr lang="pt-BR"/>
           </a:p>
@@ -766,7 +770,7 @@
           <a:p>
             <a:fld id="{3C9368B5-4CE7-416F-948F-D4F1A6F6C364}" type="datetimeFigureOut">
               <a:rPr lang="pt-BR" smtClean="0"/>
-              <a:t>29/08/2020</a:t>
+              <a:t>07/09/2020</a:t>
             </a:fld>
             <a:endParaRPr lang="pt-BR"/>
           </a:p>
@@ -1012,7 +1016,7 @@
           <a:p>
             <a:fld id="{3C9368B5-4CE7-416F-948F-D4F1A6F6C364}" type="datetimeFigureOut">
               <a:rPr lang="pt-BR" smtClean="0"/>
-              <a:t>29/08/2020</a:t>
+              <a:t>07/09/2020</a:t>
             </a:fld>
             <a:endParaRPr lang="pt-BR"/>
           </a:p>
@@ -1244,7 +1248,7 @@
           <a:p>
             <a:fld id="{3C9368B5-4CE7-416F-948F-D4F1A6F6C364}" type="datetimeFigureOut">
               <a:rPr lang="pt-BR" smtClean="0"/>
-              <a:t>29/08/2020</a:t>
+              <a:t>07/09/2020</a:t>
             </a:fld>
             <a:endParaRPr lang="pt-BR"/>
           </a:p>
@@ -1611,7 +1615,7 @@
           <a:p>
             <a:fld id="{3C9368B5-4CE7-416F-948F-D4F1A6F6C364}" type="datetimeFigureOut">
               <a:rPr lang="pt-BR" smtClean="0"/>
-              <a:t>29/08/2020</a:t>
+              <a:t>07/09/2020</a:t>
             </a:fld>
             <a:endParaRPr lang="pt-BR"/>
           </a:p>
@@ -1729,7 +1733,7 @@
           <a:p>
             <a:fld id="{3C9368B5-4CE7-416F-948F-D4F1A6F6C364}" type="datetimeFigureOut">
               <a:rPr lang="pt-BR" smtClean="0"/>
-              <a:t>29/08/2020</a:t>
+              <a:t>07/09/2020</a:t>
             </a:fld>
             <a:endParaRPr lang="pt-BR"/>
           </a:p>
@@ -1824,7 +1828,7 @@
           <a:p>
             <a:fld id="{3C9368B5-4CE7-416F-948F-D4F1A6F6C364}" type="datetimeFigureOut">
               <a:rPr lang="pt-BR" smtClean="0"/>
-              <a:t>29/08/2020</a:t>
+              <a:t>07/09/2020</a:t>
             </a:fld>
             <a:endParaRPr lang="pt-BR"/>
           </a:p>
@@ -2101,7 +2105,7 @@
           <a:p>
             <a:fld id="{3C9368B5-4CE7-416F-948F-D4F1A6F6C364}" type="datetimeFigureOut">
               <a:rPr lang="pt-BR" smtClean="0"/>
-              <a:t>29/08/2020</a:t>
+              <a:t>07/09/2020</a:t>
             </a:fld>
             <a:endParaRPr lang="pt-BR"/>
           </a:p>
@@ -2354,7 +2358,7 @@
           <a:p>
             <a:fld id="{3C9368B5-4CE7-416F-948F-D4F1A6F6C364}" type="datetimeFigureOut">
               <a:rPr lang="pt-BR" smtClean="0"/>
-              <a:t>29/08/2020</a:t>
+              <a:t>07/09/2020</a:t>
             </a:fld>
             <a:endParaRPr lang="pt-BR"/>
           </a:p>
@@ -2567,7 +2571,7 @@
           <a:p>
             <a:fld id="{3C9368B5-4CE7-416F-948F-D4F1A6F6C364}" type="datetimeFigureOut">
               <a:rPr lang="pt-BR" smtClean="0"/>
-              <a:t>29/08/2020</a:t>
+              <a:t>07/09/2020</a:t>
             </a:fld>
             <a:endParaRPr lang="pt-BR"/>
           </a:p>
@@ -9159,6 +9163,4010 @@
     <p:extLst>
       <p:ext uri="{BB962C8B-B14F-4D97-AF65-F5344CB8AC3E}">
         <p14:creationId xmlns:p14="http://schemas.microsoft.com/office/powerpoint/2010/main" val="1287626849"/>
+      </p:ext>
+    </p:extLst>
+  </p:cSld>
+  <p:clrMapOvr>
+    <a:masterClrMapping/>
+  </p:clrMapOvr>
+</p:sld>
+</file>
+
+<file path=ppt/slides/slide5.xml><?xml version="1.0" encoding="utf-8"?>
+<p:sld xmlns:a="http://schemas.openxmlformats.org/drawingml/2006/main" xmlns:r="http://schemas.openxmlformats.org/officeDocument/2006/relationships" xmlns:p="http://schemas.openxmlformats.org/presentationml/2006/main">
+  <p:cSld>
+    <p:spTree>
+      <p:nvGrpSpPr>
+        <p:cNvPr id="1" name=""/>
+        <p:cNvGrpSpPr/>
+        <p:nvPr/>
+      </p:nvGrpSpPr>
+      <p:grpSpPr>
+        <a:xfrm>
+          <a:off x="0" y="0"/>
+          <a:ext cx="0" cy="0"/>
+          <a:chOff x="0" y="0"/>
+          <a:chExt cx="0" cy="0"/>
+        </a:xfrm>
+      </p:grpSpPr>
+    </p:spTree>
+    <p:extLst>
+      <p:ext uri="{BB962C8B-B14F-4D97-AF65-F5344CB8AC3E}">
+        <p14:creationId xmlns:p14="http://schemas.microsoft.com/office/powerpoint/2010/main" val="2903685058"/>
+      </p:ext>
+    </p:extLst>
+  </p:cSld>
+  <p:clrMapOvr>
+    <a:masterClrMapping/>
+  </p:clrMapOvr>
+</p:sld>
+</file>
+
+<file path=ppt/slides/slide6.xml><?xml version="1.0" encoding="utf-8"?>
+<p:sld xmlns:a="http://schemas.openxmlformats.org/drawingml/2006/main" xmlns:r="http://schemas.openxmlformats.org/officeDocument/2006/relationships" xmlns:p="http://schemas.openxmlformats.org/presentationml/2006/main">
+  <p:cSld>
+    <p:spTree>
+      <p:nvGrpSpPr>
+        <p:cNvPr id="1" name=""/>
+        <p:cNvGrpSpPr/>
+        <p:nvPr/>
+      </p:nvGrpSpPr>
+      <p:grpSpPr>
+        <a:xfrm>
+          <a:off x="0" y="0"/>
+          <a:ext cx="0" cy="0"/>
+          <a:chOff x="0" y="0"/>
+          <a:chExt cx="0" cy="0"/>
+        </a:xfrm>
+      </p:grpSpPr>
+      <p:sp>
+        <p:nvSpPr>
+          <p:cNvPr id="6" name="Retângulo 5"/>
+          <p:cNvSpPr/>
+          <p:nvPr/>
+        </p:nvSpPr>
+        <p:spPr>
+          <a:xfrm>
+            <a:off x="1071154" y="4429919"/>
+            <a:ext cx="1449977" cy="664595"/>
+          </a:xfrm>
+          <a:prstGeom prst="rect">
+            <a:avLst/>
+          </a:prstGeom>
+          <a:solidFill>
+            <a:schemeClr val="accent4">
+              <a:lumMod val="60000"/>
+              <a:lumOff val="40000"/>
+            </a:schemeClr>
+          </a:solidFill>
+          <a:ln>
+            <a:solidFill>
+              <a:schemeClr val="accent4">
+                <a:lumMod val="60000"/>
+                <a:lumOff val="40000"/>
+              </a:schemeClr>
+            </a:solidFill>
+          </a:ln>
+        </p:spPr>
+        <p:style>
+          <a:lnRef idx="2">
+            <a:schemeClr val="accent1">
+              <a:shade val="50000"/>
+            </a:schemeClr>
+          </a:lnRef>
+          <a:fillRef idx="1">
+            <a:schemeClr val="accent1"/>
+          </a:fillRef>
+          <a:effectRef idx="0">
+            <a:schemeClr val="accent1"/>
+          </a:effectRef>
+          <a:fontRef idx="minor">
+            <a:schemeClr val="lt1"/>
+          </a:fontRef>
+        </p:style>
+        <p:txBody>
+          <a:bodyPr rtlCol="0" anchor="ctr"/>
+          <a:lstStyle/>
+          <a:p>
+            <a:pPr algn="ctr"/>
+            <a:r>
+              <a:rPr lang="pt-BR" b="1" dirty="0" smtClean="0">
+                <a:solidFill>
+                  <a:schemeClr val="tx1"/>
+                </a:solidFill>
+              </a:rPr>
+              <a:t>Gerente</a:t>
+            </a:r>
+            <a:endParaRPr lang="pt-BR" b="1" dirty="0">
+              <a:solidFill>
+                <a:schemeClr val="tx1"/>
+              </a:solidFill>
+            </a:endParaRPr>
+          </a:p>
+        </p:txBody>
+      </p:sp>
+      <p:sp>
+        <p:nvSpPr>
+          <p:cNvPr id="7" name="Retângulo 6"/>
+          <p:cNvSpPr/>
+          <p:nvPr/>
+        </p:nvSpPr>
+        <p:spPr>
+          <a:xfrm>
+            <a:off x="2248988" y="4876517"/>
+            <a:ext cx="1449977" cy="664595"/>
+          </a:xfrm>
+          <a:prstGeom prst="rect">
+            <a:avLst/>
+          </a:prstGeom>
+          <a:solidFill>
+            <a:schemeClr val="accent4">
+              <a:lumMod val="60000"/>
+              <a:lumOff val="40000"/>
+            </a:schemeClr>
+          </a:solidFill>
+          <a:ln>
+            <a:solidFill>
+              <a:schemeClr val="accent4">
+                <a:lumMod val="60000"/>
+                <a:lumOff val="40000"/>
+              </a:schemeClr>
+            </a:solidFill>
+          </a:ln>
+        </p:spPr>
+        <p:style>
+          <a:lnRef idx="2">
+            <a:schemeClr val="accent1">
+              <a:shade val="50000"/>
+            </a:schemeClr>
+          </a:lnRef>
+          <a:fillRef idx="1">
+            <a:schemeClr val="accent1"/>
+          </a:fillRef>
+          <a:effectRef idx="0">
+            <a:schemeClr val="accent1"/>
+          </a:effectRef>
+          <a:fontRef idx="minor">
+            <a:schemeClr val="lt1"/>
+          </a:fontRef>
+        </p:style>
+        <p:txBody>
+          <a:bodyPr rtlCol="0" anchor="ctr"/>
+          <a:lstStyle/>
+          <a:p>
+            <a:pPr algn="ctr"/>
+            <a:r>
+              <a:rPr lang="pt-BR" b="1" dirty="0" smtClean="0">
+                <a:solidFill>
+                  <a:schemeClr val="tx1"/>
+                </a:solidFill>
+              </a:rPr>
+              <a:t>Analista</a:t>
+            </a:r>
+            <a:endParaRPr lang="pt-BR" b="1" dirty="0">
+              <a:solidFill>
+                <a:schemeClr val="tx1"/>
+              </a:solidFill>
+            </a:endParaRPr>
+          </a:p>
+        </p:txBody>
+      </p:sp>
+      <p:sp>
+        <p:nvSpPr>
+          <p:cNvPr id="8" name="Retângulo 7"/>
+          <p:cNvSpPr/>
+          <p:nvPr/>
+        </p:nvSpPr>
+        <p:spPr>
+          <a:xfrm>
+            <a:off x="1306295" y="5525214"/>
+            <a:ext cx="1449977" cy="664595"/>
+          </a:xfrm>
+          <a:prstGeom prst="rect">
+            <a:avLst/>
+          </a:prstGeom>
+          <a:solidFill>
+            <a:schemeClr val="accent4">
+              <a:lumMod val="60000"/>
+              <a:lumOff val="40000"/>
+            </a:schemeClr>
+          </a:solidFill>
+          <a:ln>
+            <a:solidFill>
+              <a:schemeClr val="accent4">
+                <a:lumMod val="60000"/>
+                <a:lumOff val="40000"/>
+              </a:schemeClr>
+            </a:solidFill>
+          </a:ln>
+        </p:spPr>
+        <p:style>
+          <a:lnRef idx="2">
+            <a:schemeClr val="accent1">
+              <a:shade val="50000"/>
+            </a:schemeClr>
+          </a:lnRef>
+          <a:fillRef idx="1">
+            <a:schemeClr val="accent1"/>
+          </a:fillRef>
+          <a:effectRef idx="0">
+            <a:schemeClr val="accent1"/>
+          </a:effectRef>
+          <a:fontRef idx="minor">
+            <a:schemeClr val="lt1"/>
+          </a:fontRef>
+        </p:style>
+        <p:txBody>
+          <a:bodyPr rtlCol="0" anchor="ctr"/>
+          <a:lstStyle/>
+          <a:p>
+            <a:pPr algn="ctr"/>
+            <a:r>
+              <a:rPr lang="pt-BR" b="1" dirty="0" smtClean="0">
+                <a:solidFill>
+                  <a:schemeClr val="tx1"/>
+                </a:solidFill>
+              </a:rPr>
+              <a:t>supervisor</a:t>
+            </a:r>
+            <a:endParaRPr lang="pt-BR" b="1" dirty="0">
+              <a:solidFill>
+                <a:schemeClr val="tx1"/>
+              </a:solidFill>
+            </a:endParaRPr>
+          </a:p>
+        </p:txBody>
+      </p:sp>
+      <p:sp>
+        <p:nvSpPr>
+          <p:cNvPr id="9" name="Retângulo 8"/>
+          <p:cNvSpPr/>
+          <p:nvPr/>
+        </p:nvSpPr>
+        <p:spPr>
+          <a:xfrm>
+            <a:off x="1071154" y="1835966"/>
+            <a:ext cx="1449977" cy="664595"/>
+          </a:xfrm>
+          <a:prstGeom prst="rect">
+            <a:avLst/>
+          </a:prstGeom>
+          <a:solidFill>
+            <a:schemeClr val="accent1"/>
+          </a:solidFill>
+          <a:ln>
+            <a:solidFill>
+              <a:schemeClr val="accent1"/>
+            </a:solidFill>
+          </a:ln>
+        </p:spPr>
+        <p:style>
+          <a:lnRef idx="2">
+            <a:schemeClr val="accent1">
+              <a:shade val="50000"/>
+            </a:schemeClr>
+          </a:lnRef>
+          <a:fillRef idx="1">
+            <a:schemeClr val="accent1"/>
+          </a:fillRef>
+          <a:effectRef idx="0">
+            <a:schemeClr val="accent1"/>
+          </a:effectRef>
+          <a:fontRef idx="minor">
+            <a:schemeClr val="lt1"/>
+          </a:fontRef>
+        </p:style>
+        <p:txBody>
+          <a:bodyPr rtlCol="0" anchor="ctr"/>
+          <a:lstStyle/>
+          <a:p>
+            <a:pPr algn="ctr"/>
+            <a:r>
+              <a:rPr lang="pt-BR" b="1" dirty="0" smtClean="0">
+                <a:solidFill>
+                  <a:schemeClr val="bg1"/>
+                </a:solidFill>
+              </a:rPr>
+              <a:t>Obtenção de dados</a:t>
+            </a:r>
+            <a:endParaRPr lang="pt-BR" b="1" dirty="0">
+              <a:solidFill>
+                <a:schemeClr val="bg1"/>
+              </a:solidFill>
+            </a:endParaRPr>
+          </a:p>
+        </p:txBody>
+      </p:sp>
+      <p:sp>
+        <p:nvSpPr>
+          <p:cNvPr id="10" name="Retângulo 9"/>
+          <p:cNvSpPr/>
+          <p:nvPr/>
+        </p:nvSpPr>
+        <p:spPr>
+          <a:xfrm>
+            <a:off x="2227195" y="2730412"/>
+            <a:ext cx="1717789" cy="752682"/>
+          </a:xfrm>
+          <a:prstGeom prst="rect">
+            <a:avLst/>
+          </a:prstGeom>
+          <a:solidFill>
+            <a:schemeClr val="accent6"/>
+          </a:solidFill>
+          <a:ln>
+            <a:solidFill>
+              <a:schemeClr val="accent6"/>
+            </a:solidFill>
+          </a:ln>
+        </p:spPr>
+        <p:style>
+          <a:lnRef idx="2">
+            <a:schemeClr val="accent1">
+              <a:shade val="50000"/>
+            </a:schemeClr>
+          </a:lnRef>
+          <a:fillRef idx="1">
+            <a:schemeClr val="accent1"/>
+          </a:fillRef>
+          <a:effectRef idx="0">
+            <a:schemeClr val="accent1"/>
+          </a:effectRef>
+          <a:fontRef idx="minor">
+            <a:schemeClr val="lt1"/>
+          </a:fontRef>
+        </p:style>
+        <p:txBody>
+          <a:bodyPr rtlCol="0" anchor="ctr"/>
+          <a:lstStyle/>
+          <a:p>
+            <a:pPr algn="ctr"/>
+            <a:r>
+              <a:rPr lang="pt-BR" b="1" dirty="0" smtClean="0">
+                <a:solidFill>
+                  <a:schemeClr val="bg1"/>
+                </a:solidFill>
+              </a:rPr>
+              <a:t>Analise e monitoramento </a:t>
+            </a:r>
+            <a:endParaRPr lang="pt-BR" b="1" dirty="0">
+              <a:solidFill>
+                <a:schemeClr val="bg1"/>
+              </a:solidFill>
+            </a:endParaRPr>
+          </a:p>
+        </p:txBody>
+      </p:sp>
+      <p:sp>
+        <p:nvSpPr>
+          <p:cNvPr id="23" name="Retângulo 22"/>
+          <p:cNvSpPr/>
+          <p:nvPr/>
+        </p:nvSpPr>
+        <p:spPr>
+          <a:xfrm>
+            <a:off x="5371011" y="4534403"/>
+            <a:ext cx="1449977" cy="664595"/>
+          </a:xfrm>
+          <a:prstGeom prst="rect">
+            <a:avLst/>
+          </a:prstGeom>
+          <a:solidFill>
+            <a:schemeClr val="accent6"/>
+          </a:solidFill>
+          <a:ln>
+            <a:solidFill>
+              <a:schemeClr val="accent6"/>
+            </a:solidFill>
+          </a:ln>
+        </p:spPr>
+        <p:style>
+          <a:lnRef idx="2">
+            <a:schemeClr val="accent1">
+              <a:shade val="50000"/>
+            </a:schemeClr>
+          </a:lnRef>
+          <a:fillRef idx="1">
+            <a:schemeClr val="accent1"/>
+          </a:fillRef>
+          <a:effectRef idx="0">
+            <a:schemeClr val="accent1"/>
+          </a:effectRef>
+          <a:fontRef idx="minor">
+            <a:schemeClr val="lt1"/>
+          </a:fontRef>
+        </p:style>
+        <p:txBody>
+          <a:bodyPr rtlCol="0" anchor="ctr"/>
+          <a:lstStyle/>
+          <a:p>
+            <a:pPr algn="ctr"/>
+            <a:r>
+              <a:rPr lang="pt-BR" b="1" dirty="0" smtClean="0">
+                <a:solidFill>
+                  <a:schemeClr val="bg1"/>
+                </a:solidFill>
+              </a:rPr>
+              <a:t>Relatório</a:t>
+            </a:r>
+            <a:endParaRPr lang="pt-BR" b="1" dirty="0">
+              <a:solidFill>
+                <a:schemeClr val="bg1"/>
+              </a:solidFill>
+            </a:endParaRPr>
+          </a:p>
+        </p:txBody>
+      </p:sp>
+      <p:sp>
+        <p:nvSpPr>
+          <p:cNvPr id="29" name="Retângulo 28"/>
+          <p:cNvSpPr/>
+          <p:nvPr/>
+        </p:nvSpPr>
+        <p:spPr>
+          <a:xfrm>
+            <a:off x="5347470" y="1876132"/>
+            <a:ext cx="1441269" cy="653716"/>
+          </a:xfrm>
+          <a:prstGeom prst="rect">
+            <a:avLst/>
+          </a:prstGeom>
+          <a:solidFill>
+            <a:schemeClr val="accent1"/>
+          </a:solidFill>
+          <a:ln>
+            <a:solidFill>
+              <a:schemeClr val="accent1"/>
+            </a:solidFill>
+          </a:ln>
+        </p:spPr>
+        <p:style>
+          <a:lnRef idx="2">
+            <a:schemeClr val="accent1">
+              <a:shade val="50000"/>
+            </a:schemeClr>
+          </a:lnRef>
+          <a:fillRef idx="1">
+            <a:schemeClr val="accent1"/>
+          </a:fillRef>
+          <a:effectRef idx="0">
+            <a:schemeClr val="accent1"/>
+          </a:effectRef>
+          <a:fontRef idx="minor">
+            <a:schemeClr val="lt1"/>
+          </a:fontRef>
+        </p:style>
+        <p:txBody>
+          <a:bodyPr rtlCol="0" anchor="ctr"/>
+          <a:lstStyle/>
+          <a:p>
+            <a:pPr algn="ctr"/>
+            <a:r>
+              <a:rPr lang="pt-BR" b="1" dirty="0" smtClean="0">
+                <a:solidFill>
+                  <a:schemeClr val="bg1"/>
+                </a:solidFill>
+              </a:rPr>
+              <a:t>API</a:t>
+            </a:r>
+            <a:endParaRPr lang="pt-BR" b="1" dirty="0">
+              <a:solidFill>
+                <a:schemeClr val="bg1"/>
+              </a:solidFill>
+            </a:endParaRPr>
+          </a:p>
+        </p:txBody>
+      </p:sp>
+      <p:sp>
+        <p:nvSpPr>
+          <p:cNvPr id="27" name="CaixaDeTexto 26"/>
+          <p:cNvSpPr txBox="1"/>
+          <p:nvPr/>
+        </p:nvSpPr>
+        <p:spPr>
+          <a:xfrm>
+            <a:off x="2756272" y="208437"/>
+            <a:ext cx="6679457" cy="769441"/>
+          </a:xfrm>
+          <a:prstGeom prst="rect">
+            <a:avLst/>
+          </a:prstGeom>
+          <a:noFill/>
+        </p:spPr>
+        <p:txBody>
+          <a:bodyPr wrap="none" rtlCol="0">
+            <a:spAutoFit/>
+          </a:bodyPr>
+          <a:lstStyle/>
+          <a:p>
+            <a:r>
+              <a:rPr lang="pt-BR" sz="4400" dirty="0" smtClean="0">
+                <a:solidFill>
+                  <a:schemeClr val="accent2"/>
+                </a:solidFill>
+              </a:rPr>
+              <a:t>Monitoramento de máquina</a:t>
+            </a:r>
+            <a:endParaRPr lang="pt-BR" sz="4400" dirty="0">
+              <a:solidFill>
+                <a:schemeClr val="accent2"/>
+              </a:solidFill>
+            </a:endParaRPr>
+          </a:p>
+        </p:txBody>
+      </p:sp>
+      <p:sp>
+        <p:nvSpPr>
+          <p:cNvPr id="38" name="Retângulo 37"/>
+          <p:cNvSpPr/>
+          <p:nvPr/>
+        </p:nvSpPr>
+        <p:spPr>
+          <a:xfrm>
+            <a:off x="5375355" y="3595728"/>
+            <a:ext cx="1441269" cy="653716"/>
+          </a:xfrm>
+          <a:prstGeom prst="rect">
+            <a:avLst/>
+          </a:prstGeom>
+          <a:solidFill>
+            <a:schemeClr val="accent6"/>
+          </a:solidFill>
+          <a:ln>
+            <a:solidFill>
+              <a:schemeClr val="accent6"/>
+            </a:solidFill>
+          </a:ln>
+        </p:spPr>
+        <p:style>
+          <a:lnRef idx="2">
+            <a:schemeClr val="accent1">
+              <a:shade val="50000"/>
+            </a:schemeClr>
+          </a:lnRef>
+          <a:fillRef idx="1">
+            <a:schemeClr val="accent1"/>
+          </a:fillRef>
+          <a:effectRef idx="0">
+            <a:schemeClr val="accent1"/>
+          </a:effectRef>
+          <a:fontRef idx="minor">
+            <a:schemeClr val="lt1"/>
+          </a:fontRef>
+        </p:style>
+        <p:txBody>
+          <a:bodyPr rtlCol="0" anchor="ctr"/>
+          <a:lstStyle/>
+          <a:p>
+            <a:pPr algn="ctr"/>
+            <a:r>
+              <a:rPr lang="pt-BR" b="1" dirty="0" err="1" smtClean="0">
+                <a:solidFill>
+                  <a:schemeClr val="bg1"/>
+                </a:solidFill>
+              </a:rPr>
+              <a:t>Dashboard</a:t>
+            </a:r>
+            <a:endParaRPr lang="pt-BR" b="1" dirty="0">
+              <a:solidFill>
+                <a:schemeClr val="bg1"/>
+              </a:solidFill>
+            </a:endParaRPr>
+          </a:p>
+        </p:txBody>
+      </p:sp>
+      <p:grpSp>
+        <p:nvGrpSpPr>
+          <p:cNvPr id="42" name="Agrupar 41"/>
+          <p:cNvGrpSpPr/>
+          <p:nvPr/>
+        </p:nvGrpSpPr>
+        <p:grpSpPr>
+          <a:xfrm>
+            <a:off x="600891" y="223967"/>
+            <a:ext cx="10907486" cy="6529530"/>
+            <a:chOff x="600891" y="223967"/>
+            <a:chExt cx="10907486" cy="6529530"/>
+          </a:xfrm>
+        </p:grpSpPr>
+        <p:grpSp>
+          <p:nvGrpSpPr>
+            <p:cNvPr id="43" name="Agrupar 42"/>
+            <p:cNvGrpSpPr/>
+            <p:nvPr/>
+          </p:nvGrpSpPr>
+          <p:grpSpPr>
+            <a:xfrm>
+              <a:off x="600891" y="223967"/>
+              <a:ext cx="10907486" cy="6529530"/>
+              <a:chOff x="600891" y="223967"/>
+              <a:chExt cx="10907486" cy="6529530"/>
+            </a:xfrm>
+          </p:grpSpPr>
+          <p:sp>
+            <p:nvSpPr>
+              <p:cNvPr id="48" name="Retângulo 47"/>
+              <p:cNvSpPr/>
+              <p:nvPr/>
+            </p:nvSpPr>
+            <p:spPr>
+              <a:xfrm>
+                <a:off x="600891" y="223967"/>
+                <a:ext cx="10907486" cy="837961"/>
+              </a:xfrm>
+              <a:prstGeom prst="rect">
+                <a:avLst/>
+              </a:prstGeom>
+              <a:noFill/>
+              <a:ln w="57150">
+                <a:solidFill>
+                  <a:schemeClr val="tx1"/>
+                </a:solidFill>
+              </a:ln>
+            </p:spPr>
+            <p:style>
+              <a:lnRef idx="2">
+                <a:schemeClr val="accent1">
+                  <a:shade val="50000"/>
+                </a:schemeClr>
+              </a:lnRef>
+              <a:fillRef idx="1">
+                <a:schemeClr val="accent1"/>
+              </a:fillRef>
+              <a:effectRef idx="0">
+                <a:schemeClr val="accent1"/>
+              </a:effectRef>
+              <a:fontRef idx="minor">
+                <a:schemeClr val="lt1"/>
+              </a:fontRef>
+            </p:style>
+            <p:txBody>
+              <a:bodyPr rtlCol="0" anchor="ctr"/>
+              <a:lstStyle/>
+              <a:p>
+                <a:pPr algn="ctr"/>
+                <a:endParaRPr lang="pt-BR"/>
+              </a:p>
+            </p:txBody>
+          </p:sp>
+          <p:sp>
+            <p:nvSpPr>
+              <p:cNvPr id="49" name="Retângulo 48"/>
+              <p:cNvSpPr/>
+              <p:nvPr/>
+            </p:nvSpPr>
+            <p:spPr>
+              <a:xfrm>
+                <a:off x="600891" y="1238103"/>
+                <a:ext cx="10907486" cy="5515394"/>
+              </a:xfrm>
+              <a:prstGeom prst="rect">
+                <a:avLst/>
+              </a:prstGeom>
+              <a:noFill/>
+              <a:ln w="57150">
+                <a:solidFill>
+                  <a:schemeClr val="tx1"/>
+                </a:solidFill>
+              </a:ln>
+            </p:spPr>
+            <p:style>
+              <a:lnRef idx="2">
+                <a:schemeClr val="accent1">
+                  <a:shade val="50000"/>
+                </a:schemeClr>
+              </a:lnRef>
+              <a:fillRef idx="1">
+                <a:schemeClr val="accent1"/>
+              </a:fillRef>
+              <a:effectRef idx="0">
+                <a:schemeClr val="accent1"/>
+              </a:effectRef>
+              <a:fontRef idx="minor">
+                <a:schemeClr val="lt1"/>
+              </a:fontRef>
+            </p:style>
+            <p:txBody>
+              <a:bodyPr rtlCol="0" anchor="ctr"/>
+              <a:lstStyle/>
+              <a:p>
+                <a:pPr algn="ctr"/>
+                <a:endParaRPr lang="pt-BR"/>
+              </a:p>
+            </p:txBody>
+          </p:sp>
+          <p:cxnSp>
+            <p:nvCxnSpPr>
+              <p:cNvPr id="50" name="Conector reto 49"/>
+              <p:cNvCxnSpPr/>
+              <p:nvPr/>
+            </p:nvCxnSpPr>
+            <p:spPr>
+              <a:xfrm flipV="1">
+                <a:off x="836023" y="3840480"/>
+                <a:ext cx="3513908" cy="0"/>
+              </a:xfrm>
+              <a:prstGeom prst="line">
+                <a:avLst/>
+              </a:prstGeom>
+              <a:ln w="38100">
+                <a:solidFill>
+                  <a:schemeClr val="tx1"/>
+                </a:solidFill>
+              </a:ln>
+            </p:spPr>
+            <p:style>
+              <a:lnRef idx="1">
+                <a:schemeClr val="accent1"/>
+              </a:lnRef>
+              <a:fillRef idx="0">
+                <a:schemeClr val="accent1"/>
+              </a:fillRef>
+              <a:effectRef idx="0">
+                <a:schemeClr val="accent1"/>
+              </a:effectRef>
+              <a:fontRef idx="minor">
+                <a:schemeClr val="tx1"/>
+              </a:fontRef>
+            </p:style>
+          </p:cxnSp>
+          <p:cxnSp>
+            <p:nvCxnSpPr>
+              <p:cNvPr id="51" name="Conector reto 50"/>
+              <p:cNvCxnSpPr/>
+              <p:nvPr/>
+            </p:nvCxnSpPr>
+            <p:spPr>
+              <a:xfrm>
+                <a:off x="4502331" y="1515291"/>
+                <a:ext cx="0" cy="4794069"/>
+              </a:xfrm>
+              <a:prstGeom prst="line">
+                <a:avLst/>
+              </a:prstGeom>
+              <a:ln w="38100">
+                <a:solidFill>
+                  <a:schemeClr val="tx1"/>
+                </a:solidFill>
+              </a:ln>
+            </p:spPr>
+            <p:style>
+              <a:lnRef idx="1">
+                <a:schemeClr val="accent1"/>
+              </a:lnRef>
+              <a:fillRef idx="0">
+                <a:schemeClr val="accent1"/>
+              </a:fillRef>
+              <a:effectRef idx="0">
+                <a:schemeClr val="accent1"/>
+              </a:effectRef>
+              <a:fontRef idx="minor">
+                <a:schemeClr val="tx1"/>
+              </a:fontRef>
+            </p:style>
+          </p:cxnSp>
+          <p:cxnSp>
+            <p:nvCxnSpPr>
+              <p:cNvPr id="52" name="Conector reto 51"/>
+              <p:cNvCxnSpPr/>
+              <p:nvPr/>
+            </p:nvCxnSpPr>
+            <p:spPr>
+              <a:xfrm>
+                <a:off x="7894319" y="1443445"/>
+                <a:ext cx="0" cy="4794069"/>
+              </a:xfrm>
+              <a:prstGeom prst="line">
+                <a:avLst/>
+              </a:prstGeom>
+              <a:ln w="38100">
+                <a:solidFill>
+                  <a:schemeClr val="tx1"/>
+                </a:solidFill>
+              </a:ln>
+            </p:spPr>
+            <p:style>
+              <a:lnRef idx="1">
+                <a:schemeClr val="accent1"/>
+              </a:lnRef>
+              <a:fillRef idx="0">
+                <a:schemeClr val="accent1"/>
+              </a:fillRef>
+              <a:effectRef idx="0">
+                <a:schemeClr val="accent1"/>
+              </a:effectRef>
+              <a:fontRef idx="minor">
+                <a:schemeClr val="tx1"/>
+              </a:fontRef>
+            </p:style>
+          </p:cxnSp>
+        </p:grpSp>
+        <p:sp>
+          <p:nvSpPr>
+            <p:cNvPr id="44" name="CaixaDeTexto 43"/>
+            <p:cNvSpPr txBox="1"/>
+            <p:nvPr/>
+          </p:nvSpPr>
+          <p:spPr>
+            <a:xfrm>
+              <a:off x="824607" y="1378547"/>
+              <a:ext cx="3525324" cy="369332"/>
+            </a:xfrm>
+            <a:prstGeom prst="rect">
+              <a:avLst/>
+            </a:prstGeom>
+            <a:noFill/>
+          </p:spPr>
+          <p:txBody>
+            <a:bodyPr wrap="none" rtlCol="0">
+              <a:spAutoFit/>
+            </a:bodyPr>
+            <a:lstStyle/>
+            <a:p>
+              <a:r>
+                <a:rPr lang="pt-BR" b="1" dirty="0" smtClean="0"/>
+                <a:t>Necessidades/Tarefas Identificadas</a:t>
+              </a:r>
+              <a:endParaRPr lang="pt-BR" b="1" dirty="0"/>
+            </a:p>
+          </p:txBody>
+        </p:sp>
+        <p:sp>
+          <p:nvSpPr>
+            <p:cNvPr id="45" name="CaixaDeTexto 44"/>
+            <p:cNvSpPr txBox="1"/>
+            <p:nvPr/>
+          </p:nvSpPr>
+          <p:spPr>
+            <a:xfrm>
+              <a:off x="5153297" y="1330625"/>
+              <a:ext cx="1712777" cy="369332"/>
+            </a:xfrm>
+            <a:prstGeom prst="rect">
+              <a:avLst/>
+            </a:prstGeom>
+            <a:noFill/>
+          </p:spPr>
+          <p:txBody>
+            <a:bodyPr wrap="none" rtlCol="0">
+              <a:spAutoFit/>
+            </a:bodyPr>
+            <a:lstStyle/>
+            <a:p>
+              <a:r>
+                <a:rPr lang="pt-BR" b="1" dirty="0" smtClean="0"/>
+                <a:t>Ideia e Soluções</a:t>
+              </a:r>
+              <a:endParaRPr lang="pt-BR" b="1" dirty="0"/>
+            </a:p>
+          </p:txBody>
+        </p:sp>
+        <p:sp>
+          <p:nvSpPr>
+            <p:cNvPr id="46" name="CaixaDeTexto 45"/>
+            <p:cNvSpPr txBox="1"/>
+            <p:nvPr/>
+          </p:nvSpPr>
+          <p:spPr>
+            <a:xfrm>
+              <a:off x="8527026" y="1218470"/>
+              <a:ext cx="2330316" cy="646331"/>
+            </a:xfrm>
+            <a:prstGeom prst="rect">
+              <a:avLst/>
+            </a:prstGeom>
+            <a:noFill/>
+          </p:spPr>
+          <p:txBody>
+            <a:bodyPr wrap="square" rtlCol="0">
+              <a:spAutoFit/>
+            </a:bodyPr>
+            <a:lstStyle/>
+            <a:p>
+              <a:pPr algn="just"/>
+              <a:r>
+                <a:rPr lang="pt-BR" b="1" dirty="0" smtClean="0"/>
+                <a:t>Benefícios para o negócio e para o time</a:t>
+              </a:r>
+              <a:endParaRPr lang="pt-BR" b="1" dirty="0"/>
+            </a:p>
+          </p:txBody>
+        </p:sp>
+      </p:grpSp>
+      <p:sp>
+        <p:nvSpPr>
+          <p:cNvPr id="31" name="CaixaDeTexto 30"/>
+          <p:cNvSpPr txBox="1"/>
+          <p:nvPr/>
+        </p:nvSpPr>
+        <p:spPr>
+          <a:xfrm>
+            <a:off x="1676321" y="3859292"/>
+            <a:ext cx="1809983" cy="369332"/>
+          </a:xfrm>
+          <a:prstGeom prst="rect">
+            <a:avLst/>
+          </a:prstGeom>
+          <a:noFill/>
+        </p:spPr>
+        <p:txBody>
+          <a:bodyPr wrap="none" rtlCol="0">
+            <a:spAutoFit/>
+          </a:bodyPr>
+          <a:lstStyle/>
+          <a:p>
+            <a:r>
+              <a:rPr lang="pt-BR" b="1" dirty="0" smtClean="0"/>
+              <a:t>Cliente e Usuário</a:t>
+            </a:r>
+            <a:endParaRPr lang="pt-BR" b="1" dirty="0"/>
+          </a:p>
+        </p:txBody>
+      </p:sp>
+      <p:sp>
+        <p:nvSpPr>
+          <p:cNvPr id="41" name="Retângulo 40"/>
+          <p:cNvSpPr/>
+          <p:nvPr/>
+        </p:nvSpPr>
+        <p:spPr>
+          <a:xfrm>
+            <a:off x="5371011" y="5541112"/>
+            <a:ext cx="1449977" cy="664595"/>
+          </a:xfrm>
+          <a:prstGeom prst="rect">
+            <a:avLst/>
+          </a:prstGeom>
+          <a:solidFill>
+            <a:schemeClr val="accent6"/>
+          </a:solidFill>
+          <a:ln>
+            <a:solidFill>
+              <a:schemeClr val="accent6"/>
+            </a:solidFill>
+          </a:ln>
+        </p:spPr>
+        <p:style>
+          <a:lnRef idx="2">
+            <a:schemeClr val="accent1">
+              <a:shade val="50000"/>
+            </a:schemeClr>
+          </a:lnRef>
+          <a:fillRef idx="1">
+            <a:schemeClr val="accent1"/>
+          </a:fillRef>
+          <a:effectRef idx="0">
+            <a:schemeClr val="accent1"/>
+          </a:effectRef>
+          <a:fontRef idx="minor">
+            <a:schemeClr val="lt1"/>
+          </a:fontRef>
+        </p:style>
+        <p:txBody>
+          <a:bodyPr rtlCol="0" anchor="ctr"/>
+          <a:lstStyle/>
+          <a:p>
+            <a:pPr algn="ctr"/>
+            <a:r>
+              <a:rPr lang="pt-BR" b="1" dirty="0" smtClean="0">
+                <a:solidFill>
+                  <a:schemeClr val="bg1"/>
+                </a:solidFill>
+              </a:rPr>
+              <a:t>Notificações</a:t>
+            </a:r>
+            <a:endParaRPr lang="pt-BR" b="1" dirty="0">
+              <a:solidFill>
+                <a:schemeClr val="bg1"/>
+              </a:solidFill>
+            </a:endParaRPr>
+          </a:p>
+        </p:txBody>
+      </p:sp>
+      <p:sp>
+        <p:nvSpPr>
+          <p:cNvPr id="47" name="Retângulo 46"/>
+          <p:cNvSpPr/>
+          <p:nvPr/>
+        </p:nvSpPr>
+        <p:spPr>
+          <a:xfrm>
+            <a:off x="5375355" y="2655575"/>
+            <a:ext cx="1441269" cy="653716"/>
+          </a:xfrm>
+          <a:prstGeom prst="rect">
+            <a:avLst/>
+          </a:prstGeom>
+          <a:solidFill>
+            <a:schemeClr val="accent1"/>
+          </a:solidFill>
+          <a:ln>
+            <a:solidFill>
+              <a:schemeClr val="accent1"/>
+            </a:solidFill>
+          </a:ln>
+        </p:spPr>
+        <p:style>
+          <a:lnRef idx="2">
+            <a:schemeClr val="accent1">
+              <a:shade val="50000"/>
+            </a:schemeClr>
+          </a:lnRef>
+          <a:fillRef idx="1">
+            <a:schemeClr val="accent1"/>
+          </a:fillRef>
+          <a:effectRef idx="0">
+            <a:schemeClr val="accent1"/>
+          </a:effectRef>
+          <a:fontRef idx="minor">
+            <a:schemeClr val="lt1"/>
+          </a:fontRef>
+        </p:style>
+        <p:txBody>
+          <a:bodyPr rtlCol="0" anchor="ctr"/>
+          <a:lstStyle/>
+          <a:p>
+            <a:pPr algn="ctr"/>
+            <a:r>
+              <a:rPr lang="pt-BR" b="1" dirty="0" smtClean="0">
+                <a:solidFill>
+                  <a:schemeClr val="bg1"/>
+                </a:solidFill>
+              </a:rPr>
+              <a:t>Banco de Dados</a:t>
+            </a:r>
+            <a:endParaRPr lang="pt-BR" b="1" dirty="0">
+              <a:solidFill>
+                <a:schemeClr val="bg1"/>
+              </a:solidFill>
+            </a:endParaRPr>
+          </a:p>
+        </p:txBody>
+      </p:sp>
+      <p:sp>
+        <p:nvSpPr>
+          <p:cNvPr id="53" name="Retângulo 52"/>
+          <p:cNvSpPr/>
+          <p:nvPr/>
+        </p:nvSpPr>
+        <p:spPr>
+          <a:xfrm>
+            <a:off x="8405208" y="2040976"/>
+            <a:ext cx="1775518" cy="653716"/>
+          </a:xfrm>
+          <a:prstGeom prst="rect">
+            <a:avLst/>
+          </a:prstGeom>
+          <a:solidFill>
+            <a:schemeClr val="accent1"/>
+          </a:solidFill>
+          <a:ln>
+            <a:solidFill>
+              <a:schemeClr val="accent1"/>
+            </a:solidFill>
+          </a:ln>
+        </p:spPr>
+        <p:style>
+          <a:lnRef idx="2">
+            <a:schemeClr val="accent1">
+              <a:shade val="50000"/>
+            </a:schemeClr>
+          </a:lnRef>
+          <a:fillRef idx="1">
+            <a:schemeClr val="accent1"/>
+          </a:fillRef>
+          <a:effectRef idx="0">
+            <a:schemeClr val="accent1"/>
+          </a:effectRef>
+          <a:fontRef idx="minor">
+            <a:schemeClr val="lt1"/>
+          </a:fontRef>
+        </p:style>
+        <p:txBody>
+          <a:bodyPr rtlCol="0" anchor="ctr"/>
+          <a:lstStyle/>
+          <a:p>
+            <a:pPr algn="ctr"/>
+            <a:r>
+              <a:rPr lang="pt-BR" b="1" dirty="0" smtClean="0">
+                <a:solidFill>
+                  <a:schemeClr val="bg1"/>
+                </a:solidFill>
+              </a:rPr>
+              <a:t>Disponibilidade de dados</a:t>
+            </a:r>
+            <a:endParaRPr lang="pt-BR" b="1" dirty="0">
+              <a:solidFill>
+                <a:schemeClr val="bg1"/>
+              </a:solidFill>
+            </a:endParaRPr>
+          </a:p>
+        </p:txBody>
+      </p:sp>
+      <p:sp>
+        <p:nvSpPr>
+          <p:cNvPr id="54" name="Retângulo 53"/>
+          <p:cNvSpPr/>
+          <p:nvPr/>
+        </p:nvSpPr>
+        <p:spPr>
+          <a:xfrm>
+            <a:off x="9403282" y="2680422"/>
+            <a:ext cx="1441269" cy="653716"/>
+          </a:xfrm>
+          <a:prstGeom prst="rect">
+            <a:avLst/>
+          </a:prstGeom>
+          <a:solidFill>
+            <a:schemeClr val="accent1"/>
+          </a:solidFill>
+          <a:ln>
+            <a:solidFill>
+              <a:schemeClr val="accent1"/>
+            </a:solidFill>
+          </a:ln>
+        </p:spPr>
+        <p:style>
+          <a:lnRef idx="2">
+            <a:schemeClr val="accent1">
+              <a:shade val="50000"/>
+            </a:schemeClr>
+          </a:lnRef>
+          <a:fillRef idx="1">
+            <a:schemeClr val="accent1"/>
+          </a:fillRef>
+          <a:effectRef idx="0">
+            <a:schemeClr val="accent1"/>
+          </a:effectRef>
+          <a:fontRef idx="minor">
+            <a:schemeClr val="lt1"/>
+          </a:fontRef>
+        </p:style>
+        <p:txBody>
+          <a:bodyPr rtlCol="0" anchor="ctr"/>
+          <a:lstStyle/>
+          <a:p>
+            <a:pPr algn="ctr"/>
+            <a:r>
+              <a:rPr lang="pt-BR" b="1" dirty="0" smtClean="0">
+                <a:solidFill>
+                  <a:schemeClr val="bg1"/>
+                </a:solidFill>
+              </a:rPr>
+              <a:t>Guardar dados</a:t>
+            </a:r>
+            <a:endParaRPr lang="pt-BR" b="1" dirty="0">
+              <a:solidFill>
+                <a:schemeClr val="bg1"/>
+              </a:solidFill>
+            </a:endParaRPr>
+          </a:p>
+        </p:txBody>
+      </p:sp>
+      <p:sp>
+        <p:nvSpPr>
+          <p:cNvPr id="55" name="Retângulo 54"/>
+          <p:cNvSpPr/>
+          <p:nvPr/>
+        </p:nvSpPr>
+        <p:spPr>
+          <a:xfrm>
+            <a:off x="8572332" y="3982291"/>
+            <a:ext cx="1441269" cy="653716"/>
+          </a:xfrm>
+          <a:prstGeom prst="rect">
+            <a:avLst/>
+          </a:prstGeom>
+          <a:solidFill>
+            <a:schemeClr val="accent6"/>
+          </a:solidFill>
+          <a:ln>
+            <a:solidFill>
+              <a:schemeClr val="accent6"/>
+            </a:solidFill>
+          </a:ln>
+        </p:spPr>
+        <p:style>
+          <a:lnRef idx="2">
+            <a:schemeClr val="accent1">
+              <a:shade val="50000"/>
+            </a:schemeClr>
+          </a:lnRef>
+          <a:fillRef idx="1">
+            <a:schemeClr val="accent1"/>
+          </a:fillRef>
+          <a:effectRef idx="0">
+            <a:schemeClr val="accent1"/>
+          </a:effectRef>
+          <a:fontRef idx="minor">
+            <a:schemeClr val="lt1"/>
+          </a:fontRef>
+        </p:style>
+        <p:txBody>
+          <a:bodyPr rtlCol="0" anchor="ctr"/>
+          <a:lstStyle/>
+          <a:p>
+            <a:pPr algn="ctr"/>
+            <a:r>
+              <a:rPr lang="pt-BR" b="1" dirty="0" smtClean="0">
+                <a:solidFill>
+                  <a:schemeClr val="bg1"/>
+                </a:solidFill>
+              </a:rPr>
+              <a:t>Visibilidade de dados</a:t>
+            </a:r>
+            <a:endParaRPr lang="pt-BR" b="1" dirty="0">
+              <a:solidFill>
+                <a:schemeClr val="bg1"/>
+              </a:solidFill>
+            </a:endParaRPr>
+          </a:p>
+        </p:txBody>
+      </p:sp>
+      <p:sp>
+        <p:nvSpPr>
+          <p:cNvPr id="56" name="Retângulo 55"/>
+          <p:cNvSpPr/>
+          <p:nvPr/>
+        </p:nvSpPr>
+        <p:spPr>
+          <a:xfrm>
+            <a:off x="9601918" y="4610066"/>
+            <a:ext cx="1441269" cy="653716"/>
+          </a:xfrm>
+          <a:prstGeom prst="rect">
+            <a:avLst/>
+          </a:prstGeom>
+          <a:solidFill>
+            <a:schemeClr val="accent6"/>
+          </a:solidFill>
+          <a:ln>
+            <a:solidFill>
+              <a:schemeClr val="accent6"/>
+            </a:solidFill>
+          </a:ln>
+        </p:spPr>
+        <p:style>
+          <a:lnRef idx="2">
+            <a:schemeClr val="accent1">
+              <a:shade val="50000"/>
+            </a:schemeClr>
+          </a:lnRef>
+          <a:fillRef idx="1">
+            <a:schemeClr val="accent1"/>
+          </a:fillRef>
+          <a:effectRef idx="0">
+            <a:schemeClr val="accent1"/>
+          </a:effectRef>
+          <a:fontRef idx="minor">
+            <a:schemeClr val="lt1"/>
+          </a:fontRef>
+        </p:style>
+        <p:txBody>
+          <a:bodyPr rtlCol="0" anchor="ctr"/>
+          <a:lstStyle/>
+          <a:p>
+            <a:pPr algn="ctr"/>
+            <a:r>
+              <a:rPr lang="pt-BR" b="1" dirty="0" smtClean="0">
+                <a:solidFill>
+                  <a:schemeClr val="bg1"/>
+                </a:solidFill>
+              </a:rPr>
+              <a:t>Visão de negócio</a:t>
+            </a:r>
+            <a:endParaRPr lang="pt-BR" b="1" dirty="0">
+              <a:solidFill>
+                <a:schemeClr val="bg1"/>
+              </a:solidFill>
+            </a:endParaRPr>
+          </a:p>
+        </p:txBody>
+      </p:sp>
+      <p:sp>
+        <p:nvSpPr>
+          <p:cNvPr id="57" name="Retângulo 56"/>
+          <p:cNvSpPr/>
+          <p:nvPr/>
+        </p:nvSpPr>
+        <p:spPr>
+          <a:xfrm>
+            <a:off x="8831136" y="5412939"/>
+            <a:ext cx="1441269" cy="653716"/>
+          </a:xfrm>
+          <a:prstGeom prst="rect">
+            <a:avLst/>
+          </a:prstGeom>
+          <a:solidFill>
+            <a:schemeClr val="accent6"/>
+          </a:solidFill>
+          <a:ln>
+            <a:solidFill>
+              <a:schemeClr val="accent6"/>
+            </a:solidFill>
+          </a:ln>
+        </p:spPr>
+        <p:style>
+          <a:lnRef idx="2">
+            <a:schemeClr val="accent1">
+              <a:shade val="50000"/>
+            </a:schemeClr>
+          </a:lnRef>
+          <a:fillRef idx="1">
+            <a:schemeClr val="accent1"/>
+          </a:fillRef>
+          <a:effectRef idx="0">
+            <a:schemeClr val="accent1"/>
+          </a:effectRef>
+          <a:fontRef idx="minor">
+            <a:schemeClr val="lt1"/>
+          </a:fontRef>
+        </p:style>
+        <p:txBody>
+          <a:bodyPr rtlCol="0" anchor="ctr"/>
+          <a:lstStyle/>
+          <a:p>
+            <a:pPr algn="ctr"/>
+            <a:r>
+              <a:rPr lang="pt-BR" b="1" dirty="0" smtClean="0">
+                <a:solidFill>
+                  <a:schemeClr val="bg1"/>
+                </a:solidFill>
+              </a:rPr>
+              <a:t>Decisões mais rápidas</a:t>
+            </a:r>
+            <a:endParaRPr lang="pt-BR" b="1" dirty="0">
+              <a:solidFill>
+                <a:schemeClr val="bg1"/>
+              </a:solidFill>
+            </a:endParaRPr>
+          </a:p>
+        </p:txBody>
+      </p:sp>
+    </p:spTree>
+    <p:extLst>
+      <p:ext uri="{BB962C8B-B14F-4D97-AF65-F5344CB8AC3E}">
+        <p14:creationId xmlns:p14="http://schemas.microsoft.com/office/powerpoint/2010/main" val="3369261202"/>
+      </p:ext>
+    </p:extLst>
+  </p:cSld>
+  <p:clrMapOvr>
+    <a:masterClrMapping/>
+  </p:clrMapOvr>
+</p:sld>
+</file>
+
+<file path=ppt/slides/slide7.xml><?xml version="1.0" encoding="utf-8"?>
+<p:sld xmlns:a="http://schemas.openxmlformats.org/drawingml/2006/main" xmlns:r="http://schemas.openxmlformats.org/officeDocument/2006/relationships" xmlns:p="http://schemas.openxmlformats.org/presentationml/2006/main">
+  <p:cSld>
+    <p:spTree>
+      <p:nvGrpSpPr>
+        <p:cNvPr id="1" name=""/>
+        <p:cNvGrpSpPr/>
+        <p:nvPr/>
+      </p:nvGrpSpPr>
+      <p:grpSpPr>
+        <a:xfrm>
+          <a:off x="0" y="0"/>
+          <a:ext cx="0" cy="0"/>
+          <a:chOff x="0" y="0"/>
+          <a:chExt cx="0" cy="0"/>
+        </a:xfrm>
+      </p:grpSpPr>
+      <p:sp>
+        <p:nvSpPr>
+          <p:cNvPr id="6" name="Retângulo 5"/>
+          <p:cNvSpPr/>
+          <p:nvPr/>
+        </p:nvSpPr>
+        <p:spPr>
+          <a:xfrm>
+            <a:off x="1071154" y="4429919"/>
+            <a:ext cx="1449977" cy="664595"/>
+          </a:xfrm>
+          <a:prstGeom prst="rect">
+            <a:avLst/>
+          </a:prstGeom>
+          <a:solidFill>
+            <a:schemeClr val="accent4">
+              <a:lumMod val="60000"/>
+              <a:lumOff val="40000"/>
+            </a:schemeClr>
+          </a:solidFill>
+          <a:ln>
+            <a:solidFill>
+              <a:schemeClr val="accent4">
+                <a:lumMod val="60000"/>
+                <a:lumOff val="40000"/>
+              </a:schemeClr>
+            </a:solidFill>
+          </a:ln>
+        </p:spPr>
+        <p:style>
+          <a:lnRef idx="2">
+            <a:schemeClr val="accent1">
+              <a:shade val="50000"/>
+            </a:schemeClr>
+          </a:lnRef>
+          <a:fillRef idx="1">
+            <a:schemeClr val="accent1"/>
+          </a:fillRef>
+          <a:effectRef idx="0">
+            <a:schemeClr val="accent1"/>
+          </a:effectRef>
+          <a:fontRef idx="minor">
+            <a:schemeClr val="lt1"/>
+          </a:fontRef>
+        </p:style>
+        <p:txBody>
+          <a:bodyPr rtlCol="0" anchor="ctr"/>
+          <a:lstStyle/>
+          <a:p>
+            <a:pPr algn="ctr"/>
+            <a:r>
+              <a:rPr lang="pt-BR" b="1" dirty="0" smtClean="0">
+                <a:solidFill>
+                  <a:schemeClr val="tx1"/>
+                </a:solidFill>
+              </a:rPr>
+              <a:t>Gerente</a:t>
+            </a:r>
+            <a:endParaRPr lang="pt-BR" b="1" dirty="0">
+              <a:solidFill>
+                <a:schemeClr val="tx1"/>
+              </a:solidFill>
+            </a:endParaRPr>
+          </a:p>
+        </p:txBody>
+      </p:sp>
+      <p:sp>
+        <p:nvSpPr>
+          <p:cNvPr id="7" name="Retângulo 6"/>
+          <p:cNvSpPr/>
+          <p:nvPr/>
+        </p:nvSpPr>
+        <p:spPr>
+          <a:xfrm>
+            <a:off x="2248988" y="4876517"/>
+            <a:ext cx="1449977" cy="664595"/>
+          </a:xfrm>
+          <a:prstGeom prst="rect">
+            <a:avLst/>
+          </a:prstGeom>
+          <a:solidFill>
+            <a:schemeClr val="accent4">
+              <a:lumMod val="60000"/>
+              <a:lumOff val="40000"/>
+            </a:schemeClr>
+          </a:solidFill>
+          <a:ln>
+            <a:solidFill>
+              <a:schemeClr val="accent4">
+                <a:lumMod val="60000"/>
+                <a:lumOff val="40000"/>
+              </a:schemeClr>
+            </a:solidFill>
+          </a:ln>
+        </p:spPr>
+        <p:style>
+          <a:lnRef idx="2">
+            <a:schemeClr val="accent1">
+              <a:shade val="50000"/>
+            </a:schemeClr>
+          </a:lnRef>
+          <a:fillRef idx="1">
+            <a:schemeClr val="accent1"/>
+          </a:fillRef>
+          <a:effectRef idx="0">
+            <a:schemeClr val="accent1"/>
+          </a:effectRef>
+          <a:fontRef idx="minor">
+            <a:schemeClr val="lt1"/>
+          </a:fontRef>
+        </p:style>
+        <p:txBody>
+          <a:bodyPr rtlCol="0" anchor="ctr"/>
+          <a:lstStyle/>
+          <a:p>
+            <a:pPr algn="ctr"/>
+            <a:r>
+              <a:rPr lang="pt-BR" b="1" dirty="0" smtClean="0">
+                <a:solidFill>
+                  <a:schemeClr val="tx1"/>
+                </a:solidFill>
+              </a:rPr>
+              <a:t>Analista</a:t>
+            </a:r>
+            <a:endParaRPr lang="pt-BR" b="1" dirty="0">
+              <a:solidFill>
+                <a:schemeClr val="tx1"/>
+              </a:solidFill>
+            </a:endParaRPr>
+          </a:p>
+        </p:txBody>
+      </p:sp>
+      <p:sp>
+        <p:nvSpPr>
+          <p:cNvPr id="8" name="Retângulo 7"/>
+          <p:cNvSpPr/>
+          <p:nvPr/>
+        </p:nvSpPr>
+        <p:spPr>
+          <a:xfrm>
+            <a:off x="1306295" y="5525214"/>
+            <a:ext cx="1449977" cy="664595"/>
+          </a:xfrm>
+          <a:prstGeom prst="rect">
+            <a:avLst/>
+          </a:prstGeom>
+          <a:solidFill>
+            <a:schemeClr val="accent4">
+              <a:lumMod val="60000"/>
+              <a:lumOff val="40000"/>
+            </a:schemeClr>
+          </a:solidFill>
+          <a:ln>
+            <a:solidFill>
+              <a:schemeClr val="accent4">
+                <a:lumMod val="60000"/>
+                <a:lumOff val="40000"/>
+              </a:schemeClr>
+            </a:solidFill>
+          </a:ln>
+        </p:spPr>
+        <p:style>
+          <a:lnRef idx="2">
+            <a:schemeClr val="accent1">
+              <a:shade val="50000"/>
+            </a:schemeClr>
+          </a:lnRef>
+          <a:fillRef idx="1">
+            <a:schemeClr val="accent1"/>
+          </a:fillRef>
+          <a:effectRef idx="0">
+            <a:schemeClr val="accent1"/>
+          </a:effectRef>
+          <a:fontRef idx="minor">
+            <a:schemeClr val="lt1"/>
+          </a:fontRef>
+        </p:style>
+        <p:txBody>
+          <a:bodyPr rtlCol="0" anchor="ctr"/>
+          <a:lstStyle/>
+          <a:p>
+            <a:pPr algn="ctr"/>
+            <a:r>
+              <a:rPr lang="pt-BR" b="1" dirty="0" smtClean="0">
+                <a:solidFill>
+                  <a:schemeClr val="tx1"/>
+                </a:solidFill>
+              </a:rPr>
+              <a:t>supervisor</a:t>
+            </a:r>
+            <a:endParaRPr lang="pt-BR" b="1" dirty="0">
+              <a:solidFill>
+                <a:schemeClr val="tx1"/>
+              </a:solidFill>
+            </a:endParaRPr>
+          </a:p>
+        </p:txBody>
+      </p:sp>
+      <p:sp>
+        <p:nvSpPr>
+          <p:cNvPr id="10" name="Retângulo 9"/>
+          <p:cNvSpPr/>
+          <p:nvPr/>
+        </p:nvSpPr>
+        <p:spPr>
+          <a:xfrm>
+            <a:off x="1171167" y="1977730"/>
+            <a:ext cx="1717789" cy="752682"/>
+          </a:xfrm>
+          <a:prstGeom prst="rect">
+            <a:avLst/>
+          </a:prstGeom>
+          <a:solidFill>
+            <a:srgbClr val="5B9BD5"/>
+          </a:solidFill>
+          <a:ln>
+            <a:noFill/>
+          </a:ln>
+        </p:spPr>
+        <p:style>
+          <a:lnRef idx="2">
+            <a:schemeClr val="accent1">
+              <a:shade val="50000"/>
+            </a:schemeClr>
+          </a:lnRef>
+          <a:fillRef idx="1">
+            <a:schemeClr val="accent1"/>
+          </a:fillRef>
+          <a:effectRef idx="0">
+            <a:schemeClr val="accent1"/>
+          </a:effectRef>
+          <a:fontRef idx="minor">
+            <a:schemeClr val="lt1"/>
+          </a:fontRef>
+        </p:style>
+        <p:txBody>
+          <a:bodyPr rtlCol="0" anchor="ctr"/>
+          <a:lstStyle/>
+          <a:p>
+            <a:pPr algn="ctr"/>
+            <a:r>
+              <a:rPr lang="pt-BR" b="1" dirty="0" smtClean="0">
+                <a:solidFill>
+                  <a:schemeClr val="bg1"/>
+                </a:solidFill>
+              </a:rPr>
+              <a:t>Histórico</a:t>
+            </a:r>
+            <a:endParaRPr lang="pt-BR" b="1" dirty="0">
+              <a:solidFill>
+                <a:schemeClr val="bg1"/>
+              </a:solidFill>
+            </a:endParaRPr>
+          </a:p>
+        </p:txBody>
+      </p:sp>
+      <p:sp>
+        <p:nvSpPr>
+          <p:cNvPr id="23" name="Retângulo 22"/>
+          <p:cNvSpPr/>
+          <p:nvPr/>
+        </p:nvSpPr>
+        <p:spPr>
+          <a:xfrm>
+            <a:off x="4798414" y="4602772"/>
+            <a:ext cx="1449977" cy="664595"/>
+          </a:xfrm>
+          <a:prstGeom prst="rect">
+            <a:avLst/>
+          </a:prstGeom>
+          <a:solidFill>
+            <a:srgbClr val="70AD47"/>
+          </a:solidFill>
+          <a:ln>
+            <a:noFill/>
+          </a:ln>
+        </p:spPr>
+        <p:style>
+          <a:lnRef idx="2">
+            <a:schemeClr val="accent1">
+              <a:shade val="50000"/>
+            </a:schemeClr>
+          </a:lnRef>
+          <a:fillRef idx="1">
+            <a:schemeClr val="accent1"/>
+          </a:fillRef>
+          <a:effectRef idx="0">
+            <a:schemeClr val="accent1"/>
+          </a:effectRef>
+          <a:fontRef idx="minor">
+            <a:schemeClr val="lt1"/>
+          </a:fontRef>
+        </p:style>
+        <p:txBody>
+          <a:bodyPr rtlCol="0" anchor="ctr"/>
+          <a:lstStyle/>
+          <a:p>
+            <a:pPr algn="ctr"/>
+            <a:r>
+              <a:rPr lang="pt-BR" b="1" dirty="0" smtClean="0">
+                <a:solidFill>
+                  <a:schemeClr val="bg1"/>
+                </a:solidFill>
+              </a:rPr>
+              <a:t>API</a:t>
+            </a:r>
+            <a:endParaRPr lang="pt-BR" b="1" dirty="0">
+              <a:solidFill>
+                <a:schemeClr val="bg1"/>
+              </a:solidFill>
+            </a:endParaRPr>
+          </a:p>
+        </p:txBody>
+      </p:sp>
+      <p:sp>
+        <p:nvSpPr>
+          <p:cNvPr id="29" name="Retângulo 28"/>
+          <p:cNvSpPr/>
+          <p:nvPr/>
+        </p:nvSpPr>
+        <p:spPr>
+          <a:xfrm>
+            <a:off x="5744090" y="1726431"/>
+            <a:ext cx="1441269" cy="653716"/>
+          </a:xfrm>
+          <a:prstGeom prst="rect">
+            <a:avLst/>
+          </a:prstGeom>
+          <a:solidFill>
+            <a:schemeClr val="accent1"/>
+          </a:solidFill>
+          <a:ln>
+            <a:solidFill>
+              <a:schemeClr val="accent1"/>
+            </a:solidFill>
+          </a:ln>
+        </p:spPr>
+        <p:style>
+          <a:lnRef idx="2">
+            <a:schemeClr val="accent1">
+              <a:shade val="50000"/>
+            </a:schemeClr>
+          </a:lnRef>
+          <a:fillRef idx="1">
+            <a:schemeClr val="accent1"/>
+          </a:fillRef>
+          <a:effectRef idx="0">
+            <a:schemeClr val="accent1"/>
+          </a:effectRef>
+          <a:fontRef idx="minor">
+            <a:schemeClr val="lt1"/>
+          </a:fontRef>
+        </p:style>
+        <p:txBody>
+          <a:bodyPr rtlCol="0" anchor="ctr"/>
+          <a:lstStyle/>
+          <a:p>
+            <a:pPr algn="ctr"/>
+            <a:r>
+              <a:rPr lang="pt-BR" b="1" dirty="0" smtClean="0">
+                <a:solidFill>
+                  <a:schemeClr val="bg1"/>
+                </a:solidFill>
+              </a:rPr>
+              <a:t>API</a:t>
+            </a:r>
+            <a:endParaRPr lang="pt-BR" b="1" dirty="0">
+              <a:solidFill>
+                <a:schemeClr val="bg1"/>
+              </a:solidFill>
+            </a:endParaRPr>
+          </a:p>
+        </p:txBody>
+      </p:sp>
+      <p:sp>
+        <p:nvSpPr>
+          <p:cNvPr id="27" name="CaixaDeTexto 26"/>
+          <p:cNvSpPr txBox="1"/>
+          <p:nvPr/>
+        </p:nvSpPr>
+        <p:spPr>
+          <a:xfrm>
+            <a:off x="3098513" y="208437"/>
+            <a:ext cx="5994974" cy="769441"/>
+          </a:xfrm>
+          <a:prstGeom prst="rect">
+            <a:avLst/>
+          </a:prstGeom>
+          <a:noFill/>
+        </p:spPr>
+        <p:txBody>
+          <a:bodyPr wrap="none" rtlCol="0">
+            <a:spAutoFit/>
+          </a:bodyPr>
+          <a:lstStyle/>
+          <a:p>
+            <a:r>
+              <a:rPr lang="pt-BR" sz="4400" dirty="0" smtClean="0">
+                <a:solidFill>
+                  <a:schemeClr val="accent2"/>
+                </a:solidFill>
+              </a:rPr>
+              <a:t>Analise e monitoramento</a:t>
+            </a:r>
+            <a:endParaRPr lang="pt-BR" sz="4400" dirty="0">
+              <a:solidFill>
+                <a:schemeClr val="accent2"/>
+              </a:solidFill>
+            </a:endParaRPr>
+          </a:p>
+        </p:txBody>
+      </p:sp>
+      <p:sp>
+        <p:nvSpPr>
+          <p:cNvPr id="38" name="Retângulo 37"/>
+          <p:cNvSpPr/>
+          <p:nvPr/>
+        </p:nvSpPr>
+        <p:spPr>
+          <a:xfrm>
+            <a:off x="5152004" y="3636822"/>
+            <a:ext cx="1441269" cy="653716"/>
+          </a:xfrm>
+          <a:prstGeom prst="rect">
+            <a:avLst/>
+          </a:prstGeom>
+          <a:solidFill>
+            <a:srgbClr val="5B9BD5"/>
+          </a:solidFill>
+          <a:ln>
+            <a:noFill/>
+          </a:ln>
+        </p:spPr>
+        <p:style>
+          <a:lnRef idx="2">
+            <a:schemeClr val="accent1">
+              <a:shade val="50000"/>
+            </a:schemeClr>
+          </a:lnRef>
+          <a:fillRef idx="1">
+            <a:schemeClr val="accent1"/>
+          </a:fillRef>
+          <a:effectRef idx="0">
+            <a:schemeClr val="accent1"/>
+          </a:effectRef>
+          <a:fontRef idx="minor">
+            <a:schemeClr val="lt1"/>
+          </a:fontRef>
+        </p:style>
+        <p:txBody>
+          <a:bodyPr rtlCol="0" anchor="ctr"/>
+          <a:lstStyle/>
+          <a:p>
+            <a:pPr algn="ctr"/>
+            <a:r>
+              <a:rPr lang="pt-BR" b="1" dirty="0" smtClean="0">
+                <a:solidFill>
+                  <a:schemeClr val="bg1"/>
+                </a:solidFill>
+              </a:rPr>
+              <a:t>Relatório</a:t>
+            </a:r>
+            <a:endParaRPr lang="pt-BR" b="1" dirty="0">
+              <a:solidFill>
+                <a:schemeClr val="bg1"/>
+              </a:solidFill>
+            </a:endParaRPr>
+          </a:p>
+        </p:txBody>
+      </p:sp>
+      <p:grpSp>
+        <p:nvGrpSpPr>
+          <p:cNvPr id="42" name="Agrupar 41"/>
+          <p:cNvGrpSpPr/>
+          <p:nvPr/>
+        </p:nvGrpSpPr>
+        <p:grpSpPr>
+          <a:xfrm>
+            <a:off x="600891" y="223967"/>
+            <a:ext cx="10907486" cy="6529530"/>
+            <a:chOff x="600891" y="223967"/>
+            <a:chExt cx="10907486" cy="6529530"/>
+          </a:xfrm>
+        </p:grpSpPr>
+        <p:grpSp>
+          <p:nvGrpSpPr>
+            <p:cNvPr id="43" name="Agrupar 42"/>
+            <p:cNvGrpSpPr/>
+            <p:nvPr/>
+          </p:nvGrpSpPr>
+          <p:grpSpPr>
+            <a:xfrm>
+              <a:off x="600891" y="223967"/>
+              <a:ext cx="10907486" cy="6529530"/>
+              <a:chOff x="600891" y="223967"/>
+              <a:chExt cx="10907486" cy="6529530"/>
+            </a:xfrm>
+          </p:grpSpPr>
+          <p:sp>
+            <p:nvSpPr>
+              <p:cNvPr id="48" name="Retângulo 47"/>
+              <p:cNvSpPr/>
+              <p:nvPr/>
+            </p:nvSpPr>
+            <p:spPr>
+              <a:xfrm>
+                <a:off x="600891" y="223967"/>
+                <a:ext cx="10907486" cy="837961"/>
+              </a:xfrm>
+              <a:prstGeom prst="rect">
+                <a:avLst/>
+              </a:prstGeom>
+              <a:noFill/>
+              <a:ln w="57150">
+                <a:solidFill>
+                  <a:schemeClr val="tx1"/>
+                </a:solidFill>
+              </a:ln>
+            </p:spPr>
+            <p:style>
+              <a:lnRef idx="2">
+                <a:schemeClr val="accent1">
+                  <a:shade val="50000"/>
+                </a:schemeClr>
+              </a:lnRef>
+              <a:fillRef idx="1">
+                <a:schemeClr val="accent1"/>
+              </a:fillRef>
+              <a:effectRef idx="0">
+                <a:schemeClr val="accent1"/>
+              </a:effectRef>
+              <a:fontRef idx="minor">
+                <a:schemeClr val="lt1"/>
+              </a:fontRef>
+            </p:style>
+            <p:txBody>
+              <a:bodyPr rtlCol="0" anchor="ctr"/>
+              <a:lstStyle/>
+              <a:p>
+                <a:pPr algn="ctr"/>
+                <a:endParaRPr lang="pt-BR"/>
+              </a:p>
+            </p:txBody>
+          </p:sp>
+          <p:sp>
+            <p:nvSpPr>
+              <p:cNvPr id="49" name="Retângulo 48"/>
+              <p:cNvSpPr/>
+              <p:nvPr/>
+            </p:nvSpPr>
+            <p:spPr>
+              <a:xfrm>
+                <a:off x="600891" y="1238103"/>
+                <a:ext cx="10907486" cy="5515394"/>
+              </a:xfrm>
+              <a:prstGeom prst="rect">
+                <a:avLst/>
+              </a:prstGeom>
+              <a:noFill/>
+              <a:ln w="57150">
+                <a:solidFill>
+                  <a:schemeClr val="tx1"/>
+                </a:solidFill>
+              </a:ln>
+            </p:spPr>
+            <p:style>
+              <a:lnRef idx="2">
+                <a:schemeClr val="accent1">
+                  <a:shade val="50000"/>
+                </a:schemeClr>
+              </a:lnRef>
+              <a:fillRef idx="1">
+                <a:schemeClr val="accent1"/>
+              </a:fillRef>
+              <a:effectRef idx="0">
+                <a:schemeClr val="accent1"/>
+              </a:effectRef>
+              <a:fontRef idx="minor">
+                <a:schemeClr val="lt1"/>
+              </a:fontRef>
+            </p:style>
+            <p:txBody>
+              <a:bodyPr rtlCol="0" anchor="ctr"/>
+              <a:lstStyle/>
+              <a:p>
+                <a:pPr algn="ctr"/>
+                <a:endParaRPr lang="pt-BR"/>
+              </a:p>
+            </p:txBody>
+          </p:sp>
+          <p:cxnSp>
+            <p:nvCxnSpPr>
+              <p:cNvPr id="50" name="Conector reto 49"/>
+              <p:cNvCxnSpPr/>
+              <p:nvPr/>
+            </p:nvCxnSpPr>
+            <p:spPr>
+              <a:xfrm flipV="1">
+                <a:off x="836023" y="3840480"/>
+                <a:ext cx="3513908" cy="0"/>
+              </a:xfrm>
+              <a:prstGeom prst="line">
+                <a:avLst/>
+              </a:prstGeom>
+              <a:ln w="38100">
+                <a:solidFill>
+                  <a:schemeClr val="tx1"/>
+                </a:solidFill>
+              </a:ln>
+            </p:spPr>
+            <p:style>
+              <a:lnRef idx="1">
+                <a:schemeClr val="accent1"/>
+              </a:lnRef>
+              <a:fillRef idx="0">
+                <a:schemeClr val="accent1"/>
+              </a:fillRef>
+              <a:effectRef idx="0">
+                <a:schemeClr val="accent1"/>
+              </a:effectRef>
+              <a:fontRef idx="minor">
+                <a:schemeClr val="tx1"/>
+              </a:fontRef>
+            </p:style>
+          </p:cxnSp>
+          <p:cxnSp>
+            <p:nvCxnSpPr>
+              <p:cNvPr id="51" name="Conector reto 50"/>
+              <p:cNvCxnSpPr/>
+              <p:nvPr/>
+            </p:nvCxnSpPr>
+            <p:spPr>
+              <a:xfrm>
+                <a:off x="4502331" y="1515291"/>
+                <a:ext cx="0" cy="4794069"/>
+              </a:xfrm>
+              <a:prstGeom prst="line">
+                <a:avLst/>
+              </a:prstGeom>
+              <a:ln w="38100">
+                <a:solidFill>
+                  <a:schemeClr val="tx1"/>
+                </a:solidFill>
+              </a:ln>
+            </p:spPr>
+            <p:style>
+              <a:lnRef idx="1">
+                <a:schemeClr val="accent1"/>
+              </a:lnRef>
+              <a:fillRef idx="0">
+                <a:schemeClr val="accent1"/>
+              </a:fillRef>
+              <a:effectRef idx="0">
+                <a:schemeClr val="accent1"/>
+              </a:effectRef>
+              <a:fontRef idx="minor">
+                <a:schemeClr val="tx1"/>
+              </a:fontRef>
+            </p:style>
+          </p:cxnSp>
+          <p:cxnSp>
+            <p:nvCxnSpPr>
+              <p:cNvPr id="52" name="Conector reto 51"/>
+              <p:cNvCxnSpPr/>
+              <p:nvPr/>
+            </p:nvCxnSpPr>
+            <p:spPr>
+              <a:xfrm>
+                <a:off x="7894319" y="1443445"/>
+                <a:ext cx="0" cy="4794069"/>
+              </a:xfrm>
+              <a:prstGeom prst="line">
+                <a:avLst/>
+              </a:prstGeom>
+              <a:ln w="38100">
+                <a:solidFill>
+                  <a:schemeClr val="tx1"/>
+                </a:solidFill>
+              </a:ln>
+            </p:spPr>
+            <p:style>
+              <a:lnRef idx="1">
+                <a:schemeClr val="accent1"/>
+              </a:lnRef>
+              <a:fillRef idx="0">
+                <a:schemeClr val="accent1"/>
+              </a:fillRef>
+              <a:effectRef idx="0">
+                <a:schemeClr val="accent1"/>
+              </a:effectRef>
+              <a:fontRef idx="minor">
+                <a:schemeClr val="tx1"/>
+              </a:fontRef>
+            </p:style>
+          </p:cxnSp>
+        </p:grpSp>
+        <p:sp>
+          <p:nvSpPr>
+            <p:cNvPr id="44" name="CaixaDeTexto 43"/>
+            <p:cNvSpPr txBox="1"/>
+            <p:nvPr/>
+          </p:nvSpPr>
+          <p:spPr>
+            <a:xfrm>
+              <a:off x="824607" y="1378547"/>
+              <a:ext cx="3525324" cy="369332"/>
+            </a:xfrm>
+            <a:prstGeom prst="rect">
+              <a:avLst/>
+            </a:prstGeom>
+            <a:noFill/>
+          </p:spPr>
+          <p:txBody>
+            <a:bodyPr wrap="none" rtlCol="0">
+              <a:spAutoFit/>
+            </a:bodyPr>
+            <a:lstStyle/>
+            <a:p>
+              <a:r>
+                <a:rPr lang="pt-BR" b="1" dirty="0" smtClean="0"/>
+                <a:t>Necessidades/Tarefas Identificadas</a:t>
+              </a:r>
+              <a:endParaRPr lang="pt-BR" b="1" dirty="0"/>
+            </a:p>
+          </p:txBody>
+        </p:sp>
+        <p:sp>
+          <p:nvSpPr>
+            <p:cNvPr id="45" name="CaixaDeTexto 44"/>
+            <p:cNvSpPr txBox="1"/>
+            <p:nvPr/>
+          </p:nvSpPr>
+          <p:spPr>
+            <a:xfrm>
+              <a:off x="5153297" y="1330625"/>
+              <a:ext cx="1712777" cy="369332"/>
+            </a:xfrm>
+            <a:prstGeom prst="rect">
+              <a:avLst/>
+            </a:prstGeom>
+            <a:noFill/>
+          </p:spPr>
+          <p:txBody>
+            <a:bodyPr wrap="none" rtlCol="0">
+              <a:spAutoFit/>
+            </a:bodyPr>
+            <a:lstStyle/>
+            <a:p>
+              <a:r>
+                <a:rPr lang="pt-BR" b="1" dirty="0" smtClean="0"/>
+                <a:t>Ideia e Soluções</a:t>
+              </a:r>
+              <a:endParaRPr lang="pt-BR" b="1" dirty="0"/>
+            </a:p>
+          </p:txBody>
+        </p:sp>
+        <p:sp>
+          <p:nvSpPr>
+            <p:cNvPr id="46" name="CaixaDeTexto 45"/>
+            <p:cNvSpPr txBox="1"/>
+            <p:nvPr/>
+          </p:nvSpPr>
+          <p:spPr>
+            <a:xfrm>
+              <a:off x="8527026" y="1218470"/>
+              <a:ext cx="2330316" cy="646331"/>
+            </a:xfrm>
+            <a:prstGeom prst="rect">
+              <a:avLst/>
+            </a:prstGeom>
+            <a:noFill/>
+          </p:spPr>
+          <p:txBody>
+            <a:bodyPr wrap="square" rtlCol="0">
+              <a:spAutoFit/>
+            </a:bodyPr>
+            <a:lstStyle/>
+            <a:p>
+              <a:pPr algn="just"/>
+              <a:r>
+                <a:rPr lang="pt-BR" b="1" dirty="0" smtClean="0"/>
+                <a:t>Benefícios para o negócio e para o time</a:t>
+              </a:r>
+              <a:endParaRPr lang="pt-BR" b="1" dirty="0"/>
+            </a:p>
+          </p:txBody>
+        </p:sp>
+      </p:grpSp>
+      <p:sp>
+        <p:nvSpPr>
+          <p:cNvPr id="31" name="CaixaDeTexto 30"/>
+          <p:cNvSpPr txBox="1"/>
+          <p:nvPr/>
+        </p:nvSpPr>
+        <p:spPr>
+          <a:xfrm>
+            <a:off x="1676321" y="3859292"/>
+            <a:ext cx="1809983" cy="369332"/>
+          </a:xfrm>
+          <a:prstGeom prst="rect">
+            <a:avLst/>
+          </a:prstGeom>
+          <a:noFill/>
+        </p:spPr>
+        <p:txBody>
+          <a:bodyPr wrap="none" rtlCol="0">
+            <a:spAutoFit/>
+          </a:bodyPr>
+          <a:lstStyle/>
+          <a:p>
+            <a:r>
+              <a:rPr lang="pt-BR" b="1" dirty="0" smtClean="0"/>
+              <a:t>Cliente e Usuário</a:t>
+            </a:r>
+            <a:endParaRPr lang="pt-BR" b="1" dirty="0"/>
+          </a:p>
+        </p:txBody>
+      </p:sp>
+      <p:sp>
+        <p:nvSpPr>
+          <p:cNvPr id="41" name="Retângulo 40"/>
+          <p:cNvSpPr/>
+          <p:nvPr/>
+        </p:nvSpPr>
+        <p:spPr>
+          <a:xfrm>
+            <a:off x="6096000" y="5493883"/>
+            <a:ext cx="1449977" cy="664595"/>
+          </a:xfrm>
+          <a:prstGeom prst="rect">
+            <a:avLst/>
+          </a:prstGeom>
+          <a:solidFill>
+            <a:srgbClr val="70AD47"/>
+          </a:solidFill>
+          <a:ln>
+            <a:noFill/>
+          </a:ln>
+        </p:spPr>
+        <p:style>
+          <a:lnRef idx="2">
+            <a:schemeClr val="accent1">
+              <a:shade val="50000"/>
+            </a:schemeClr>
+          </a:lnRef>
+          <a:fillRef idx="1">
+            <a:schemeClr val="accent1"/>
+          </a:fillRef>
+          <a:effectRef idx="0">
+            <a:schemeClr val="accent1"/>
+          </a:effectRef>
+          <a:fontRef idx="minor">
+            <a:schemeClr val="lt1"/>
+          </a:fontRef>
+        </p:style>
+        <p:txBody>
+          <a:bodyPr rtlCol="0" anchor="ctr"/>
+          <a:lstStyle/>
+          <a:p>
+            <a:pPr algn="ctr"/>
+            <a:r>
+              <a:rPr lang="pt-BR" b="1" dirty="0" smtClean="0">
+                <a:solidFill>
+                  <a:schemeClr val="bg1"/>
+                </a:solidFill>
+              </a:rPr>
+              <a:t>Notificações</a:t>
+            </a:r>
+            <a:endParaRPr lang="pt-BR" b="1" dirty="0">
+              <a:solidFill>
+                <a:schemeClr val="bg1"/>
+              </a:solidFill>
+            </a:endParaRPr>
+          </a:p>
+        </p:txBody>
+      </p:sp>
+      <p:sp>
+        <p:nvSpPr>
+          <p:cNvPr id="47" name="Retângulo 46"/>
+          <p:cNvSpPr/>
+          <p:nvPr/>
+        </p:nvSpPr>
+        <p:spPr>
+          <a:xfrm>
+            <a:off x="4798414" y="2546787"/>
+            <a:ext cx="1441269" cy="653716"/>
+          </a:xfrm>
+          <a:prstGeom prst="rect">
+            <a:avLst/>
+          </a:prstGeom>
+          <a:solidFill>
+            <a:schemeClr val="accent1"/>
+          </a:solidFill>
+          <a:ln>
+            <a:solidFill>
+              <a:schemeClr val="accent1"/>
+            </a:solidFill>
+          </a:ln>
+        </p:spPr>
+        <p:style>
+          <a:lnRef idx="2">
+            <a:schemeClr val="accent1">
+              <a:shade val="50000"/>
+            </a:schemeClr>
+          </a:lnRef>
+          <a:fillRef idx="1">
+            <a:schemeClr val="accent1"/>
+          </a:fillRef>
+          <a:effectRef idx="0">
+            <a:schemeClr val="accent1"/>
+          </a:effectRef>
+          <a:fontRef idx="minor">
+            <a:schemeClr val="lt1"/>
+          </a:fontRef>
+        </p:style>
+        <p:txBody>
+          <a:bodyPr rtlCol="0" anchor="ctr"/>
+          <a:lstStyle/>
+          <a:p>
+            <a:pPr algn="ctr"/>
+            <a:r>
+              <a:rPr lang="pt-BR" b="1" dirty="0" err="1" smtClean="0">
+                <a:solidFill>
+                  <a:schemeClr val="bg1"/>
+                </a:solidFill>
+              </a:rPr>
+              <a:t>Dashboard</a:t>
+            </a:r>
+            <a:endParaRPr lang="pt-BR" b="1" dirty="0">
+              <a:solidFill>
+                <a:schemeClr val="bg1"/>
+              </a:solidFill>
+            </a:endParaRPr>
+          </a:p>
+        </p:txBody>
+      </p:sp>
+      <p:sp>
+        <p:nvSpPr>
+          <p:cNvPr id="53" name="Retângulo 52"/>
+          <p:cNvSpPr/>
+          <p:nvPr/>
+        </p:nvSpPr>
+        <p:spPr>
+          <a:xfrm>
+            <a:off x="8405208" y="2040976"/>
+            <a:ext cx="1775518" cy="653716"/>
+          </a:xfrm>
+          <a:prstGeom prst="rect">
+            <a:avLst/>
+          </a:prstGeom>
+          <a:solidFill>
+            <a:schemeClr val="accent1"/>
+          </a:solidFill>
+          <a:ln>
+            <a:solidFill>
+              <a:schemeClr val="accent1"/>
+            </a:solidFill>
+          </a:ln>
+        </p:spPr>
+        <p:style>
+          <a:lnRef idx="2">
+            <a:schemeClr val="accent1">
+              <a:shade val="50000"/>
+            </a:schemeClr>
+          </a:lnRef>
+          <a:fillRef idx="1">
+            <a:schemeClr val="accent1"/>
+          </a:fillRef>
+          <a:effectRef idx="0">
+            <a:schemeClr val="accent1"/>
+          </a:effectRef>
+          <a:fontRef idx="minor">
+            <a:schemeClr val="lt1"/>
+          </a:fontRef>
+        </p:style>
+        <p:txBody>
+          <a:bodyPr rtlCol="0" anchor="ctr"/>
+          <a:lstStyle/>
+          <a:p>
+            <a:pPr algn="ctr"/>
+            <a:r>
+              <a:rPr lang="pt-BR" b="1" dirty="0" smtClean="0">
+                <a:solidFill>
+                  <a:schemeClr val="bg1"/>
+                </a:solidFill>
+              </a:rPr>
+              <a:t>Disponibilidade de dados</a:t>
+            </a:r>
+            <a:endParaRPr lang="pt-BR" b="1" dirty="0">
+              <a:solidFill>
+                <a:schemeClr val="bg1"/>
+              </a:solidFill>
+            </a:endParaRPr>
+          </a:p>
+        </p:txBody>
+      </p:sp>
+      <p:sp>
+        <p:nvSpPr>
+          <p:cNvPr id="54" name="Retângulo 53"/>
+          <p:cNvSpPr/>
+          <p:nvPr/>
+        </p:nvSpPr>
+        <p:spPr>
+          <a:xfrm>
+            <a:off x="9403282" y="2680422"/>
+            <a:ext cx="1441269" cy="653716"/>
+          </a:xfrm>
+          <a:prstGeom prst="rect">
+            <a:avLst/>
+          </a:prstGeom>
+          <a:solidFill>
+            <a:schemeClr val="accent1"/>
+          </a:solidFill>
+          <a:ln>
+            <a:solidFill>
+              <a:schemeClr val="accent1"/>
+            </a:solidFill>
+          </a:ln>
+        </p:spPr>
+        <p:style>
+          <a:lnRef idx="2">
+            <a:schemeClr val="accent1">
+              <a:shade val="50000"/>
+            </a:schemeClr>
+          </a:lnRef>
+          <a:fillRef idx="1">
+            <a:schemeClr val="accent1"/>
+          </a:fillRef>
+          <a:effectRef idx="0">
+            <a:schemeClr val="accent1"/>
+          </a:effectRef>
+          <a:fontRef idx="minor">
+            <a:schemeClr val="lt1"/>
+          </a:fontRef>
+        </p:style>
+        <p:txBody>
+          <a:bodyPr rtlCol="0" anchor="ctr"/>
+          <a:lstStyle/>
+          <a:p>
+            <a:pPr algn="ctr"/>
+            <a:r>
+              <a:rPr lang="pt-BR" b="1" dirty="0" smtClean="0">
+                <a:solidFill>
+                  <a:schemeClr val="bg1"/>
+                </a:solidFill>
+              </a:rPr>
+              <a:t>Guardar dados</a:t>
+            </a:r>
+            <a:endParaRPr lang="pt-BR" b="1" dirty="0">
+              <a:solidFill>
+                <a:schemeClr val="bg1"/>
+              </a:solidFill>
+            </a:endParaRPr>
+          </a:p>
+        </p:txBody>
+      </p:sp>
+      <p:sp>
+        <p:nvSpPr>
+          <p:cNvPr id="55" name="Retângulo 54"/>
+          <p:cNvSpPr/>
+          <p:nvPr/>
+        </p:nvSpPr>
+        <p:spPr>
+          <a:xfrm>
+            <a:off x="8430505" y="3475465"/>
+            <a:ext cx="1441269" cy="653716"/>
+          </a:xfrm>
+          <a:prstGeom prst="rect">
+            <a:avLst/>
+          </a:prstGeom>
+          <a:solidFill>
+            <a:srgbClr val="5B9BD5"/>
+          </a:solidFill>
+          <a:ln>
+            <a:noFill/>
+          </a:ln>
+        </p:spPr>
+        <p:style>
+          <a:lnRef idx="2">
+            <a:schemeClr val="accent1">
+              <a:shade val="50000"/>
+            </a:schemeClr>
+          </a:lnRef>
+          <a:fillRef idx="1">
+            <a:schemeClr val="accent1"/>
+          </a:fillRef>
+          <a:effectRef idx="0">
+            <a:schemeClr val="accent1"/>
+          </a:effectRef>
+          <a:fontRef idx="minor">
+            <a:schemeClr val="lt1"/>
+          </a:fontRef>
+        </p:style>
+        <p:txBody>
+          <a:bodyPr rtlCol="0" anchor="ctr"/>
+          <a:lstStyle/>
+          <a:p>
+            <a:pPr algn="ctr"/>
+            <a:r>
+              <a:rPr lang="pt-BR" b="1" dirty="0" smtClean="0">
+                <a:solidFill>
+                  <a:schemeClr val="bg1"/>
+                </a:solidFill>
+              </a:rPr>
+              <a:t>Visibilidade de dados</a:t>
+            </a:r>
+            <a:endParaRPr lang="pt-BR" b="1" dirty="0">
+              <a:solidFill>
+                <a:schemeClr val="bg1"/>
+              </a:solidFill>
+            </a:endParaRPr>
+          </a:p>
+        </p:txBody>
+      </p:sp>
+      <p:sp>
+        <p:nvSpPr>
+          <p:cNvPr id="56" name="Retângulo 55"/>
+          <p:cNvSpPr/>
+          <p:nvPr/>
+        </p:nvSpPr>
+        <p:spPr>
+          <a:xfrm>
+            <a:off x="9460091" y="4103240"/>
+            <a:ext cx="1441269" cy="653716"/>
+          </a:xfrm>
+          <a:prstGeom prst="rect">
+            <a:avLst/>
+          </a:prstGeom>
+          <a:solidFill>
+            <a:srgbClr val="5B9BD5"/>
+          </a:solidFill>
+          <a:ln>
+            <a:noFill/>
+          </a:ln>
+        </p:spPr>
+        <p:style>
+          <a:lnRef idx="2">
+            <a:schemeClr val="accent1">
+              <a:shade val="50000"/>
+            </a:schemeClr>
+          </a:lnRef>
+          <a:fillRef idx="1">
+            <a:schemeClr val="accent1"/>
+          </a:fillRef>
+          <a:effectRef idx="0">
+            <a:schemeClr val="accent1"/>
+          </a:effectRef>
+          <a:fontRef idx="minor">
+            <a:schemeClr val="lt1"/>
+          </a:fontRef>
+        </p:style>
+        <p:txBody>
+          <a:bodyPr rtlCol="0" anchor="ctr"/>
+          <a:lstStyle/>
+          <a:p>
+            <a:pPr algn="ctr"/>
+            <a:r>
+              <a:rPr lang="pt-BR" b="1" dirty="0" smtClean="0">
+                <a:solidFill>
+                  <a:schemeClr val="bg1"/>
+                </a:solidFill>
+              </a:rPr>
+              <a:t>Visão de negócio</a:t>
+            </a:r>
+            <a:endParaRPr lang="pt-BR" b="1" dirty="0">
+              <a:solidFill>
+                <a:schemeClr val="bg1"/>
+              </a:solidFill>
+            </a:endParaRPr>
+          </a:p>
+        </p:txBody>
+      </p:sp>
+      <p:sp>
+        <p:nvSpPr>
+          <p:cNvPr id="57" name="Retângulo 56"/>
+          <p:cNvSpPr/>
+          <p:nvPr/>
+        </p:nvSpPr>
+        <p:spPr>
+          <a:xfrm>
+            <a:off x="8831136" y="5412939"/>
+            <a:ext cx="1441269" cy="653716"/>
+          </a:xfrm>
+          <a:prstGeom prst="rect">
+            <a:avLst/>
+          </a:prstGeom>
+          <a:solidFill>
+            <a:schemeClr val="accent6"/>
+          </a:solidFill>
+          <a:ln>
+            <a:solidFill>
+              <a:schemeClr val="accent6"/>
+            </a:solidFill>
+          </a:ln>
+        </p:spPr>
+        <p:style>
+          <a:lnRef idx="2">
+            <a:schemeClr val="accent1">
+              <a:shade val="50000"/>
+            </a:schemeClr>
+          </a:lnRef>
+          <a:fillRef idx="1">
+            <a:schemeClr val="accent1"/>
+          </a:fillRef>
+          <a:effectRef idx="0">
+            <a:schemeClr val="accent1"/>
+          </a:effectRef>
+          <a:fontRef idx="minor">
+            <a:schemeClr val="lt1"/>
+          </a:fontRef>
+        </p:style>
+        <p:txBody>
+          <a:bodyPr rtlCol="0" anchor="ctr"/>
+          <a:lstStyle/>
+          <a:p>
+            <a:pPr algn="ctr"/>
+            <a:r>
+              <a:rPr lang="pt-BR" b="1" dirty="0" smtClean="0">
+                <a:solidFill>
+                  <a:schemeClr val="bg1"/>
+                </a:solidFill>
+              </a:rPr>
+              <a:t>Decisões mais rápidas</a:t>
+            </a:r>
+            <a:endParaRPr lang="pt-BR" b="1" dirty="0">
+              <a:solidFill>
+                <a:schemeClr val="bg1"/>
+              </a:solidFill>
+            </a:endParaRPr>
+          </a:p>
+        </p:txBody>
+      </p:sp>
+      <p:sp>
+        <p:nvSpPr>
+          <p:cNvPr id="30" name="Retângulo 29"/>
+          <p:cNvSpPr/>
+          <p:nvPr/>
+        </p:nvSpPr>
+        <p:spPr>
+          <a:xfrm>
+            <a:off x="1542784" y="2800669"/>
+            <a:ext cx="1717789" cy="752682"/>
+          </a:xfrm>
+          <a:prstGeom prst="rect">
+            <a:avLst/>
+          </a:prstGeom>
+          <a:solidFill>
+            <a:schemeClr val="accent6"/>
+          </a:solidFill>
+          <a:ln>
+            <a:solidFill>
+              <a:schemeClr val="accent6"/>
+            </a:solidFill>
+          </a:ln>
+        </p:spPr>
+        <p:style>
+          <a:lnRef idx="2">
+            <a:schemeClr val="accent1">
+              <a:shade val="50000"/>
+            </a:schemeClr>
+          </a:lnRef>
+          <a:fillRef idx="1">
+            <a:schemeClr val="accent1"/>
+          </a:fillRef>
+          <a:effectRef idx="0">
+            <a:schemeClr val="accent1"/>
+          </a:effectRef>
+          <a:fontRef idx="minor">
+            <a:schemeClr val="lt1"/>
+          </a:fontRef>
+        </p:style>
+        <p:txBody>
+          <a:bodyPr rtlCol="0" anchor="ctr"/>
+          <a:lstStyle/>
+          <a:p>
+            <a:pPr algn="ctr"/>
+            <a:r>
+              <a:rPr lang="pt-BR" b="1" dirty="0" smtClean="0">
+                <a:solidFill>
+                  <a:schemeClr val="bg1"/>
+                </a:solidFill>
+              </a:rPr>
+              <a:t>Real</a:t>
+            </a:r>
+            <a:endParaRPr lang="pt-BR" b="1" dirty="0">
+              <a:solidFill>
+                <a:schemeClr val="bg1"/>
+              </a:solidFill>
+            </a:endParaRPr>
+          </a:p>
+        </p:txBody>
+      </p:sp>
+      <p:sp>
+        <p:nvSpPr>
+          <p:cNvPr id="32" name="Retângulo 31"/>
+          <p:cNvSpPr/>
+          <p:nvPr/>
+        </p:nvSpPr>
+        <p:spPr>
+          <a:xfrm>
+            <a:off x="6293279" y="2899635"/>
+            <a:ext cx="1441269" cy="653716"/>
+          </a:xfrm>
+          <a:prstGeom prst="rect">
+            <a:avLst/>
+          </a:prstGeom>
+          <a:solidFill>
+            <a:srgbClr val="5B9BD5"/>
+          </a:solidFill>
+          <a:ln>
+            <a:noFill/>
+          </a:ln>
+        </p:spPr>
+        <p:style>
+          <a:lnRef idx="2">
+            <a:schemeClr val="accent1">
+              <a:shade val="50000"/>
+            </a:schemeClr>
+          </a:lnRef>
+          <a:fillRef idx="1">
+            <a:schemeClr val="accent1"/>
+          </a:fillRef>
+          <a:effectRef idx="0">
+            <a:schemeClr val="accent1"/>
+          </a:effectRef>
+          <a:fontRef idx="minor">
+            <a:schemeClr val="lt1"/>
+          </a:fontRef>
+        </p:style>
+        <p:txBody>
+          <a:bodyPr rtlCol="0" anchor="ctr"/>
+          <a:lstStyle/>
+          <a:p>
+            <a:pPr algn="ctr"/>
+            <a:r>
+              <a:rPr lang="pt-BR" b="1" dirty="0" smtClean="0">
+                <a:solidFill>
+                  <a:schemeClr val="bg1"/>
+                </a:solidFill>
+              </a:rPr>
+              <a:t>Node</a:t>
+            </a:r>
+            <a:endParaRPr lang="pt-BR" b="1" dirty="0">
+              <a:solidFill>
+                <a:schemeClr val="bg1"/>
+              </a:solidFill>
+            </a:endParaRPr>
+          </a:p>
+        </p:txBody>
+      </p:sp>
+      <p:sp>
+        <p:nvSpPr>
+          <p:cNvPr id="33" name="Retângulo 32"/>
+          <p:cNvSpPr/>
+          <p:nvPr/>
+        </p:nvSpPr>
+        <p:spPr>
+          <a:xfrm>
+            <a:off x="6346367" y="4367824"/>
+            <a:ext cx="1441269" cy="653716"/>
+          </a:xfrm>
+          <a:prstGeom prst="rect">
+            <a:avLst/>
+          </a:prstGeom>
+          <a:solidFill>
+            <a:srgbClr val="70AD47"/>
+          </a:solidFill>
+          <a:ln>
+            <a:noFill/>
+          </a:ln>
+        </p:spPr>
+        <p:style>
+          <a:lnRef idx="2">
+            <a:schemeClr val="accent1">
+              <a:shade val="50000"/>
+            </a:schemeClr>
+          </a:lnRef>
+          <a:fillRef idx="1">
+            <a:schemeClr val="accent1"/>
+          </a:fillRef>
+          <a:effectRef idx="0">
+            <a:schemeClr val="accent1"/>
+          </a:effectRef>
+          <a:fontRef idx="minor">
+            <a:schemeClr val="lt1"/>
+          </a:fontRef>
+        </p:style>
+        <p:txBody>
+          <a:bodyPr rtlCol="0" anchor="ctr"/>
+          <a:lstStyle/>
+          <a:p>
+            <a:pPr algn="ctr"/>
+            <a:r>
+              <a:rPr lang="pt-BR" b="1" dirty="0" err="1" smtClean="0">
+                <a:solidFill>
+                  <a:schemeClr val="bg1"/>
+                </a:solidFill>
+              </a:rPr>
+              <a:t>Dashboard</a:t>
+            </a:r>
+            <a:endParaRPr lang="pt-BR" b="1" dirty="0">
+              <a:solidFill>
+                <a:schemeClr val="bg1"/>
+              </a:solidFill>
+            </a:endParaRPr>
+          </a:p>
+        </p:txBody>
+      </p:sp>
+    </p:spTree>
+    <p:extLst>
+      <p:ext uri="{BB962C8B-B14F-4D97-AF65-F5344CB8AC3E}">
+        <p14:creationId xmlns:p14="http://schemas.microsoft.com/office/powerpoint/2010/main" val="1383240718"/>
+      </p:ext>
+    </p:extLst>
+  </p:cSld>
+  <p:clrMapOvr>
+    <a:masterClrMapping/>
+  </p:clrMapOvr>
+</p:sld>
+</file>
+
+<file path=ppt/slides/slide8.xml><?xml version="1.0" encoding="utf-8"?>
+<p:sld xmlns:a="http://schemas.openxmlformats.org/drawingml/2006/main" xmlns:r="http://schemas.openxmlformats.org/officeDocument/2006/relationships" xmlns:p="http://schemas.openxmlformats.org/presentationml/2006/main">
+  <p:cSld>
+    <p:spTree>
+      <p:nvGrpSpPr>
+        <p:cNvPr id="1" name=""/>
+        <p:cNvGrpSpPr/>
+        <p:nvPr/>
+      </p:nvGrpSpPr>
+      <p:grpSpPr>
+        <a:xfrm>
+          <a:off x="0" y="0"/>
+          <a:ext cx="0" cy="0"/>
+          <a:chOff x="0" y="0"/>
+          <a:chExt cx="0" cy="0"/>
+        </a:xfrm>
+      </p:grpSpPr>
+      <p:sp>
+        <p:nvSpPr>
+          <p:cNvPr id="6" name="Retângulo 5"/>
+          <p:cNvSpPr/>
+          <p:nvPr/>
+        </p:nvSpPr>
+        <p:spPr>
+          <a:xfrm>
+            <a:off x="1071154" y="4429919"/>
+            <a:ext cx="1449977" cy="664595"/>
+          </a:xfrm>
+          <a:prstGeom prst="rect">
+            <a:avLst/>
+          </a:prstGeom>
+          <a:solidFill>
+            <a:schemeClr val="accent4">
+              <a:lumMod val="60000"/>
+              <a:lumOff val="40000"/>
+            </a:schemeClr>
+          </a:solidFill>
+          <a:ln>
+            <a:solidFill>
+              <a:schemeClr val="accent4">
+                <a:lumMod val="60000"/>
+                <a:lumOff val="40000"/>
+              </a:schemeClr>
+            </a:solidFill>
+          </a:ln>
+        </p:spPr>
+        <p:style>
+          <a:lnRef idx="2">
+            <a:schemeClr val="accent1">
+              <a:shade val="50000"/>
+            </a:schemeClr>
+          </a:lnRef>
+          <a:fillRef idx="1">
+            <a:schemeClr val="accent1"/>
+          </a:fillRef>
+          <a:effectRef idx="0">
+            <a:schemeClr val="accent1"/>
+          </a:effectRef>
+          <a:fontRef idx="minor">
+            <a:schemeClr val="lt1"/>
+          </a:fontRef>
+        </p:style>
+        <p:txBody>
+          <a:bodyPr rtlCol="0" anchor="ctr"/>
+          <a:lstStyle/>
+          <a:p>
+            <a:pPr algn="ctr"/>
+            <a:r>
+              <a:rPr lang="pt-BR" b="1" dirty="0" smtClean="0">
+                <a:solidFill>
+                  <a:schemeClr val="tx1"/>
+                </a:solidFill>
+              </a:rPr>
+              <a:t>Gerente</a:t>
+            </a:r>
+            <a:endParaRPr lang="pt-BR" b="1" dirty="0">
+              <a:solidFill>
+                <a:schemeClr val="tx1"/>
+              </a:solidFill>
+            </a:endParaRPr>
+          </a:p>
+        </p:txBody>
+      </p:sp>
+      <p:sp>
+        <p:nvSpPr>
+          <p:cNvPr id="7" name="Retângulo 6"/>
+          <p:cNvSpPr/>
+          <p:nvPr/>
+        </p:nvSpPr>
+        <p:spPr>
+          <a:xfrm>
+            <a:off x="2248988" y="4876517"/>
+            <a:ext cx="1449977" cy="664595"/>
+          </a:xfrm>
+          <a:prstGeom prst="rect">
+            <a:avLst/>
+          </a:prstGeom>
+          <a:solidFill>
+            <a:schemeClr val="accent4">
+              <a:lumMod val="60000"/>
+              <a:lumOff val="40000"/>
+            </a:schemeClr>
+          </a:solidFill>
+          <a:ln>
+            <a:solidFill>
+              <a:schemeClr val="accent4">
+                <a:lumMod val="60000"/>
+                <a:lumOff val="40000"/>
+              </a:schemeClr>
+            </a:solidFill>
+          </a:ln>
+        </p:spPr>
+        <p:style>
+          <a:lnRef idx="2">
+            <a:schemeClr val="accent1">
+              <a:shade val="50000"/>
+            </a:schemeClr>
+          </a:lnRef>
+          <a:fillRef idx="1">
+            <a:schemeClr val="accent1"/>
+          </a:fillRef>
+          <a:effectRef idx="0">
+            <a:schemeClr val="accent1"/>
+          </a:effectRef>
+          <a:fontRef idx="minor">
+            <a:schemeClr val="lt1"/>
+          </a:fontRef>
+        </p:style>
+        <p:txBody>
+          <a:bodyPr rtlCol="0" anchor="ctr"/>
+          <a:lstStyle/>
+          <a:p>
+            <a:pPr algn="ctr"/>
+            <a:r>
+              <a:rPr lang="pt-BR" b="1" dirty="0" smtClean="0">
+                <a:solidFill>
+                  <a:schemeClr val="tx1"/>
+                </a:solidFill>
+              </a:rPr>
+              <a:t>Analista</a:t>
+            </a:r>
+            <a:endParaRPr lang="pt-BR" b="1" dirty="0">
+              <a:solidFill>
+                <a:schemeClr val="tx1"/>
+              </a:solidFill>
+            </a:endParaRPr>
+          </a:p>
+        </p:txBody>
+      </p:sp>
+      <p:sp>
+        <p:nvSpPr>
+          <p:cNvPr id="8" name="Retângulo 7"/>
+          <p:cNvSpPr/>
+          <p:nvPr/>
+        </p:nvSpPr>
+        <p:spPr>
+          <a:xfrm>
+            <a:off x="1306295" y="5525214"/>
+            <a:ext cx="1449977" cy="664595"/>
+          </a:xfrm>
+          <a:prstGeom prst="rect">
+            <a:avLst/>
+          </a:prstGeom>
+          <a:solidFill>
+            <a:schemeClr val="accent4">
+              <a:lumMod val="60000"/>
+              <a:lumOff val="40000"/>
+            </a:schemeClr>
+          </a:solidFill>
+          <a:ln>
+            <a:solidFill>
+              <a:schemeClr val="accent4">
+                <a:lumMod val="60000"/>
+                <a:lumOff val="40000"/>
+              </a:schemeClr>
+            </a:solidFill>
+          </a:ln>
+        </p:spPr>
+        <p:style>
+          <a:lnRef idx="2">
+            <a:schemeClr val="accent1">
+              <a:shade val="50000"/>
+            </a:schemeClr>
+          </a:lnRef>
+          <a:fillRef idx="1">
+            <a:schemeClr val="accent1"/>
+          </a:fillRef>
+          <a:effectRef idx="0">
+            <a:schemeClr val="accent1"/>
+          </a:effectRef>
+          <a:fontRef idx="minor">
+            <a:schemeClr val="lt1"/>
+          </a:fontRef>
+        </p:style>
+        <p:txBody>
+          <a:bodyPr rtlCol="0" anchor="ctr"/>
+          <a:lstStyle/>
+          <a:p>
+            <a:pPr algn="ctr"/>
+            <a:r>
+              <a:rPr lang="pt-BR" b="1" dirty="0" smtClean="0">
+                <a:solidFill>
+                  <a:schemeClr val="tx1"/>
+                </a:solidFill>
+              </a:rPr>
+              <a:t>supervisor</a:t>
+            </a:r>
+            <a:endParaRPr lang="pt-BR" b="1" dirty="0">
+              <a:solidFill>
+                <a:schemeClr val="tx1"/>
+              </a:solidFill>
+            </a:endParaRPr>
+          </a:p>
+        </p:txBody>
+      </p:sp>
+      <p:sp>
+        <p:nvSpPr>
+          <p:cNvPr id="9" name="Retângulo 8"/>
+          <p:cNvSpPr/>
+          <p:nvPr/>
+        </p:nvSpPr>
+        <p:spPr>
+          <a:xfrm>
+            <a:off x="1071154" y="1835966"/>
+            <a:ext cx="1449977" cy="664595"/>
+          </a:xfrm>
+          <a:prstGeom prst="rect">
+            <a:avLst/>
+          </a:prstGeom>
+          <a:solidFill>
+            <a:schemeClr val="accent1"/>
+          </a:solidFill>
+          <a:ln>
+            <a:solidFill>
+              <a:schemeClr val="accent1"/>
+            </a:solidFill>
+          </a:ln>
+        </p:spPr>
+        <p:style>
+          <a:lnRef idx="2">
+            <a:schemeClr val="accent1">
+              <a:shade val="50000"/>
+            </a:schemeClr>
+          </a:lnRef>
+          <a:fillRef idx="1">
+            <a:schemeClr val="accent1"/>
+          </a:fillRef>
+          <a:effectRef idx="0">
+            <a:schemeClr val="accent1"/>
+          </a:effectRef>
+          <a:fontRef idx="minor">
+            <a:schemeClr val="lt1"/>
+          </a:fontRef>
+        </p:style>
+        <p:txBody>
+          <a:bodyPr rtlCol="0" anchor="ctr"/>
+          <a:lstStyle/>
+          <a:p>
+            <a:pPr algn="ctr"/>
+            <a:r>
+              <a:rPr lang="pt-BR" b="1" dirty="0" smtClean="0">
+                <a:solidFill>
+                  <a:schemeClr val="bg1"/>
+                </a:solidFill>
+              </a:rPr>
+              <a:t>Disco/CPU/Memória</a:t>
+            </a:r>
+            <a:endParaRPr lang="pt-BR" b="1" dirty="0">
+              <a:solidFill>
+                <a:schemeClr val="bg1"/>
+              </a:solidFill>
+            </a:endParaRPr>
+          </a:p>
+        </p:txBody>
+      </p:sp>
+      <p:sp>
+        <p:nvSpPr>
+          <p:cNvPr id="29" name="Retângulo 28"/>
+          <p:cNvSpPr/>
+          <p:nvPr/>
+        </p:nvSpPr>
+        <p:spPr>
+          <a:xfrm>
+            <a:off x="4809942" y="1951882"/>
+            <a:ext cx="1441269" cy="653716"/>
+          </a:xfrm>
+          <a:prstGeom prst="rect">
+            <a:avLst/>
+          </a:prstGeom>
+          <a:solidFill>
+            <a:schemeClr val="accent1"/>
+          </a:solidFill>
+          <a:ln>
+            <a:solidFill>
+              <a:schemeClr val="accent1"/>
+            </a:solidFill>
+          </a:ln>
+        </p:spPr>
+        <p:style>
+          <a:lnRef idx="2">
+            <a:schemeClr val="accent1">
+              <a:shade val="50000"/>
+            </a:schemeClr>
+          </a:lnRef>
+          <a:fillRef idx="1">
+            <a:schemeClr val="accent1"/>
+          </a:fillRef>
+          <a:effectRef idx="0">
+            <a:schemeClr val="accent1"/>
+          </a:effectRef>
+          <a:fontRef idx="minor">
+            <a:schemeClr val="lt1"/>
+          </a:fontRef>
+        </p:style>
+        <p:txBody>
+          <a:bodyPr rtlCol="0" anchor="ctr"/>
+          <a:lstStyle/>
+          <a:p>
+            <a:pPr algn="ctr"/>
+            <a:r>
+              <a:rPr lang="pt-BR" b="1" dirty="0" smtClean="0">
+                <a:solidFill>
+                  <a:schemeClr val="bg1"/>
+                </a:solidFill>
+              </a:rPr>
+              <a:t>Python</a:t>
+            </a:r>
+            <a:endParaRPr lang="pt-BR" b="1" dirty="0">
+              <a:solidFill>
+                <a:schemeClr val="bg1"/>
+              </a:solidFill>
+            </a:endParaRPr>
+          </a:p>
+        </p:txBody>
+      </p:sp>
+      <p:sp>
+        <p:nvSpPr>
+          <p:cNvPr id="27" name="CaixaDeTexto 26"/>
+          <p:cNvSpPr txBox="1"/>
+          <p:nvPr/>
+        </p:nvSpPr>
+        <p:spPr>
+          <a:xfrm>
+            <a:off x="3779725" y="208437"/>
+            <a:ext cx="4632550" cy="769441"/>
+          </a:xfrm>
+          <a:prstGeom prst="rect">
+            <a:avLst/>
+          </a:prstGeom>
+          <a:noFill/>
+        </p:spPr>
+        <p:txBody>
+          <a:bodyPr wrap="none" rtlCol="0">
+            <a:spAutoFit/>
+          </a:bodyPr>
+          <a:lstStyle/>
+          <a:p>
+            <a:r>
+              <a:rPr lang="pt-BR" sz="4400" dirty="0" smtClean="0">
+                <a:solidFill>
+                  <a:schemeClr val="accent2"/>
+                </a:solidFill>
+              </a:rPr>
+              <a:t>Obtenção de dados</a:t>
+            </a:r>
+            <a:endParaRPr lang="pt-BR" sz="4400" dirty="0">
+              <a:solidFill>
+                <a:schemeClr val="accent2"/>
+              </a:solidFill>
+            </a:endParaRPr>
+          </a:p>
+        </p:txBody>
+      </p:sp>
+      <p:sp>
+        <p:nvSpPr>
+          <p:cNvPr id="38" name="Retângulo 37"/>
+          <p:cNvSpPr/>
+          <p:nvPr/>
+        </p:nvSpPr>
+        <p:spPr>
+          <a:xfrm>
+            <a:off x="5567353" y="2569170"/>
+            <a:ext cx="1441269" cy="653716"/>
+          </a:xfrm>
+          <a:prstGeom prst="rect">
+            <a:avLst/>
+          </a:prstGeom>
+          <a:solidFill>
+            <a:srgbClr val="5B9BD5"/>
+          </a:solidFill>
+          <a:ln>
+            <a:noFill/>
+          </a:ln>
+        </p:spPr>
+        <p:style>
+          <a:lnRef idx="2">
+            <a:schemeClr val="accent1">
+              <a:shade val="50000"/>
+            </a:schemeClr>
+          </a:lnRef>
+          <a:fillRef idx="1">
+            <a:schemeClr val="accent1"/>
+          </a:fillRef>
+          <a:effectRef idx="0">
+            <a:schemeClr val="accent1"/>
+          </a:effectRef>
+          <a:fontRef idx="minor">
+            <a:schemeClr val="lt1"/>
+          </a:fontRef>
+        </p:style>
+        <p:txBody>
+          <a:bodyPr rtlCol="0" anchor="ctr"/>
+          <a:lstStyle/>
+          <a:p>
+            <a:pPr algn="ctr"/>
+            <a:r>
+              <a:rPr lang="pt-BR" b="1" dirty="0" err="1" smtClean="0">
+                <a:solidFill>
+                  <a:schemeClr val="bg1"/>
+                </a:solidFill>
+              </a:rPr>
+              <a:t>psutil</a:t>
+            </a:r>
+            <a:endParaRPr lang="pt-BR" b="1" dirty="0">
+              <a:solidFill>
+                <a:schemeClr val="bg1"/>
+              </a:solidFill>
+            </a:endParaRPr>
+          </a:p>
+        </p:txBody>
+      </p:sp>
+      <p:grpSp>
+        <p:nvGrpSpPr>
+          <p:cNvPr id="42" name="Agrupar 41"/>
+          <p:cNvGrpSpPr/>
+          <p:nvPr/>
+        </p:nvGrpSpPr>
+        <p:grpSpPr>
+          <a:xfrm>
+            <a:off x="600891" y="223967"/>
+            <a:ext cx="10907486" cy="6529530"/>
+            <a:chOff x="600891" y="223967"/>
+            <a:chExt cx="10907486" cy="6529530"/>
+          </a:xfrm>
+        </p:grpSpPr>
+        <p:grpSp>
+          <p:nvGrpSpPr>
+            <p:cNvPr id="43" name="Agrupar 42"/>
+            <p:cNvGrpSpPr/>
+            <p:nvPr/>
+          </p:nvGrpSpPr>
+          <p:grpSpPr>
+            <a:xfrm>
+              <a:off x="600891" y="223967"/>
+              <a:ext cx="10907486" cy="6529530"/>
+              <a:chOff x="600891" y="223967"/>
+              <a:chExt cx="10907486" cy="6529530"/>
+            </a:xfrm>
+          </p:grpSpPr>
+          <p:sp>
+            <p:nvSpPr>
+              <p:cNvPr id="48" name="Retângulo 47"/>
+              <p:cNvSpPr/>
+              <p:nvPr/>
+            </p:nvSpPr>
+            <p:spPr>
+              <a:xfrm>
+                <a:off x="600891" y="223967"/>
+                <a:ext cx="10907486" cy="837961"/>
+              </a:xfrm>
+              <a:prstGeom prst="rect">
+                <a:avLst/>
+              </a:prstGeom>
+              <a:noFill/>
+              <a:ln w="57150">
+                <a:solidFill>
+                  <a:schemeClr val="tx1"/>
+                </a:solidFill>
+              </a:ln>
+            </p:spPr>
+            <p:style>
+              <a:lnRef idx="2">
+                <a:schemeClr val="accent1">
+                  <a:shade val="50000"/>
+                </a:schemeClr>
+              </a:lnRef>
+              <a:fillRef idx="1">
+                <a:schemeClr val="accent1"/>
+              </a:fillRef>
+              <a:effectRef idx="0">
+                <a:schemeClr val="accent1"/>
+              </a:effectRef>
+              <a:fontRef idx="minor">
+                <a:schemeClr val="lt1"/>
+              </a:fontRef>
+            </p:style>
+            <p:txBody>
+              <a:bodyPr rtlCol="0" anchor="ctr"/>
+              <a:lstStyle/>
+              <a:p>
+                <a:pPr algn="ctr"/>
+                <a:endParaRPr lang="pt-BR"/>
+              </a:p>
+            </p:txBody>
+          </p:sp>
+          <p:sp>
+            <p:nvSpPr>
+              <p:cNvPr id="49" name="Retângulo 48"/>
+              <p:cNvSpPr/>
+              <p:nvPr/>
+            </p:nvSpPr>
+            <p:spPr>
+              <a:xfrm>
+                <a:off x="600891" y="1238103"/>
+                <a:ext cx="10907486" cy="5515394"/>
+              </a:xfrm>
+              <a:prstGeom prst="rect">
+                <a:avLst/>
+              </a:prstGeom>
+              <a:noFill/>
+              <a:ln w="57150">
+                <a:solidFill>
+                  <a:schemeClr val="tx1"/>
+                </a:solidFill>
+              </a:ln>
+            </p:spPr>
+            <p:style>
+              <a:lnRef idx="2">
+                <a:schemeClr val="accent1">
+                  <a:shade val="50000"/>
+                </a:schemeClr>
+              </a:lnRef>
+              <a:fillRef idx="1">
+                <a:schemeClr val="accent1"/>
+              </a:fillRef>
+              <a:effectRef idx="0">
+                <a:schemeClr val="accent1"/>
+              </a:effectRef>
+              <a:fontRef idx="minor">
+                <a:schemeClr val="lt1"/>
+              </a:fontRef>
+            </p:style>
+            <p:txBody>
+              <a:bodyPr rtlCol="0" anchor="ctr"/>
+              <a:lstStyle/>
+              <a:p>
+                <a:pPr algn="ctr"/>
+                <a:endParaRPr lang="pt-BR"/>
+              </a:p>
+            </p:txBody>
+          </p:sp>
+          <p:cxnSp>
+            <p:nvCxnSpPr>
+              <p:cNvPr id="50" name="Conector reto 49"/>
+              <p:cNvCxnSpPr/>
+              <p:nvPr/>
+            </p:nvCxnSpPr>
+            <p:spPr>
+              <a:xfrm flipV="1">
+                <a:off x="836023" y="3840480"/>
+                <a:ext cx="3513908" cy="0"/>
+              </a:xfrm>
+              <a:prstGeom prst="line">
+                <a:avLst/>
+              </a:prstGeom>
+              <a:ln w="38100">
+                <a:solidFill>
+                  <a:schemeClr val="tx1"/>
+                </a:solidFill>
+              </a:ln>
+            </p:spPr>
+            <p:style>
+              <a:lnRef idx="1">
+                <a:schemeClr val="accent1"/>
+              </a:lnRef>
+              <a:fillRef idx="0">
+                <a:schemeClr val="accent1"/>
+              </a:fillRef>
+              <a:effectRef idx="0">
+                <a:schemeClr val="accent1"/>
+              </a:effectRef>
+              <a:fontRef idx="minor">
+                <a:schemeClr val="tx1"/>
+              </a:fontRef>
+            </p:style>
+          </p:cxnSp>
+          <p:cxnSp>
+            <p:nvCxnSpPr>
+              <p:cNvPr id="51" name="Conector reto 50"/>
+              <p:cNvCxnSpPr/>
+              <p:nvPr/>
+            </p:nvCxnSpPr>
+            <p:spPr>
+              <a:xfrm>
+                <a:off x="4502331" y="1515291"/>
+                <a:ext cx="0" cy="4794069"/>
+              </a:xfrm>
+              <a:prstGeom prst="line">
+                <a:avLst/>
+              </a:prstGeom>
+              <a:ln w="38100">
+                <a:solidFill>
+                  <a:schemeClr val="tx1"/>
+                </a:solidFill>
+              </a:ln>
+            </p:spPr>
+            <p:style>
+              <a:lnRef idx="1">
+                <a:schemeClr val="accent1"/>
+              </a:lnRef>
+              <a:fillRef idx="0">
+                <a:schemeClr val="accent1"/>
+              </a:fillRef>
+              <a:effectRef idx="0">
+                <a:schemeClr val="accent1"/>
+              </a:effectRef>
+              <a:fontRef idx="minor">
+                <a:schemeClr val="tx1"/>
+              </a:fontRef>
+            </p:style>
+          </p:cxnSp>
+          <p:cxnSp>
+            <p:nvCxnSpPr>
+              <p:cNvPr id="52" name="Conector reto 51"/>
+              <p:cNvCxnSpPr/>
+              <p:nvPr/>
+            </p:nvCxnSpPr>
+            <p:spPr>
+              <a:xfrm>
+                <a:off x="7894319" y="1443445"/>
+                <a:ext cx="0" cy="4794069"/>
+              </a:xfrm>
+              <a:prstGeom prst="line">
+                <a:avLst/>
+              </a:prstGeom>
+              <a:ln w="38100">
+                <a:solidFill>
+                  <a:schemeClr val="tx1"/>
+                </a:solidFill>
+              </a:ln>
+            </p:spPr>
+            <p:style>
+              <a:lnRef idx="1">
+                <a:schemeClr val="accent1"/>
+              </a:lnRef>
+              <a:fillRef idx="0">
+                <a:schemeClr val="accent1"/>
+              </a:fillRef>
+              <a:effectRef idx="0">
+                <a:schemeClr val="accent1"/>
+              </a:effectRef>
+              <a:fontRef idx="minor">
+                <a:schemeClr val="tx1"/>
+              </a:fontRef>
+            </p:style>
+          </p:cxnSp>
+        </p:grpSp>
+        <p:sp>
+          <p:nvSpPr>
+            <p:cNvPr id="44" name="CaixaDeTexto 43"/>
+            <p:cNvSpPr txBox="1"/>
+            <p:nvPr/>
+          </p:nvSpPr>
+          <p:spPr>
+            <a:xfrm>
+              <a:off x="824607" y="1378547"/>
+              <a:ext cx="3525324" cy="369332"/>
+            </a:xfrm>
+            <a:prstGeom prst="rect">
+              <a:avLst/>
+            </a:prstGeom>
+            <a:noFill/>
+          </p:spPr>
+          <p:txBody>
+            <a:bodyPr wrap="none" rtlCol="0">
+              <a:spAutoFit/>
+            </a:bodyPr>
+            <a:lstStyle/>
+            <a:p>
+              <a:r>
+                <a:rPr lang="pt-BR" b="1" dirty="0" smtClean="0"/>
+                <a:t>Necessidades/Tarefas Identificadas</a:t>
+              </a:r>
+              <a:endParaRPr lang="pt-BR" b="1" dirty="0"/>
+            </a:p>
+          </p:txBody>
+        </p:sp>
+        <p:sp>
+          <p:nvSpPr>
+            <p:cNvPr id="45" name="CaixaDeTexto 44"/>
+            <p:cNvSpPr txBox="1"/>
+            <p:nvPr/>
+          </p:nvSpPr>
+          <p:spPr>
+            <a:xfrm>
+              <a:off x="5153297" y="1330625"/>
+              <a:ext cx="1712777" cy="369332"/>
+            </a:xfrm>
+            <a:prstGeom prst="rect">
+              <a:avLst/>
+            </a:prstGeom>
+            <a:noFill/>
+          </p:spPr>
+          <p:txBody>
+            <a:bodyPr wrap="none" rtlCol="0">
+              <a:spAutoFit/>
+            </a:bodyPr>
+            <a:lstStyle/>
+            <a:p>
+              <a:r>
+                <a:rPr lang="pt-BR" b="1" dirty="0" smtClean="0"/>
+                <a:t>Ideia e Soluções</a:t>
+              </a:r>
+              <a:endParaRPr lang="pt-BR" b="1" dirty="0"/>
+            </a:p>
+          </p:txBody>
+        </p:sp>
+        <p:sp>
+          <p:nvSpPr>
+            <p:cNvPr id="46" name="CaixaDeTexto 45"/>
+            <p:cNvSpPr txBox="1"/>
+            <p:nvPr/>
+          </p:nvSpPr>
+          <p:spPr>
+            <a:xfrm>
+              <a:off x="8527026" y="1218470"/>
+              <a:ext cx="2330316" cy="646331"/>
+            </a:xfrm>
+            <a:prstGeom prst="rect">
+              <a:avLst/>
+            </a:prstGeom>
+            <a:noFill/>
+          </p:spPr>
+          <p:txBody>
+            <a:bodyPr wrap="square" rtlCol="0">
+              <a:spAutoFit/>
+            </a:bodyPr>
+            <a:lstStyle/>
+            <a:p>
+              <a:pPr algn="just"/>
+              <a:r>
+                <a:rPr lang="pt-BR" b="1" dirty="0" smtClean="0"/>
+                <a:t>Benefícios para o negócio e para o time</a:t>
+              </a:r>
+              <a:endParaRPr lang="pt-BR" b="1" dirty="0"/>
+            </a:p>
+          </p:txBody>
+        </p:sp>
+      </p:grpSp>
+      <p:sp>
+        <p:nvSpPr>
+          <p:cNvPr id="31" name="CaixaDeTexto 30"/>
+          <p:cNvSpPr txBox="1"/>
+          <p:nvPr/>
+        </p:nvSpPr>
+        <p:spPr>
+          <a:xfrm>
+            <a:off x="1676321" y="3859292"/>
+            <a:ext cx="1809983" cy="369332"/>
+          </a:xfrm>
+          <a:prstGeom prst="rect">
+            <a:avLst/>
+          </a:prstGeom>
+          <a:noFill/>
+        </p:spPr>
+        <p:txBody>
+          <a:bodyPr wrap="none" rtlCol="0">
+            <a:spAutoFit/>
+          </a:bodyPr>
+          <a:lstStyle/>
+          <a:p>
+            <a:r>
+              <a:rPr lang="pt-BR" b="1" dirty="0" smtClean="0"/>
+              <a:t>Cliente e Usuário</a:t>
+            </a:r>
+            <a:endParaRPr lang="pt-BR" b="1" dirty="0"/>
+          </a:p>
+        </p:txBody>
+      </p:sp>
+      <p:sp>
+        <p:nvSpPr>
+          <p:cNvPr id="53" name="Retângulo 52"/>
+          <p:cNvSpPr/>
+          <p:nvPr/>
+        </p:nvSpPr>
+        <p:spPr>
+          <a:xfrm>
+            <a:off x="8405208" y="2040976"/>
+            <a:ext cx="1775518" cy="653716"/>
+          </a:xfrm>
+          <a:prstGeom prst="rect">
+            <a:avLst/>
+          </a:prstGeom>
+          <a:solidFill>
+            <a:schemeClr val="accent1"/>
+          </a:solidFill>
+          <a:ln>
+            <a:solidFill>
+              <a:schemeClr val="accent1"/>
+            </a:solidFill>
+          </a:ln>
+        </p:spPr>
+        <p:style>
+          <a:lnRef idx="2">
+            <a:schemeClr val="accent1">
+              <a:shade val="50000"/>
+            </a:schemeClr>
+          </a:lnRef>
+          <a:fillRef idx="1">
+            <a:schemeClr val="accent1"/>
+          </a:fillRef>
+          <a:effectRef idx="0">
+            <a:schemeClr val="accent1"/>
+          </a:effectRef>
+          <a:fontRef idx="minor">
+            <a:schemeClr val="lt1"/>
+          </a:fontRef>
+        </p:style>
+        <p:txBody>
+          <a:bodyPr rtlCol="0" anchor="ctr"/>
+          <a:lstStyle/>
+          <a:p>
+            <a:pPr algn="ctr"/>
+            <a:r>
+              <a:rPr lang="pt-BR" b="1" dirty="0" smtClean="0">
+                <a:solidFill>
+                  <a:schemeClr val="bg1"/>
+                </a:solidFill>
+              </a:rPr>
+              <a:t>Disponibilidade de dados</a:t>
+            </a:r>
+            <a:endParaRPr lang="pt-BR" b="1" dirty="0">
+              <a:solidFill>
+                <a:schemeClr val="bg1"/>
+              </a:solidFill>
+            </a:endParaRPr>
+          </a:p>
+        </p:txBody>
+      </p:sp>
+      <p:sp>
+        <p:nvSpPr>
+          <p:cNvPr id="54" name="Retângulo 53"/>
+          <p:cNvSpPr/>
+          <p:nvPr/>
+        </p:nvSpPr>
+        <p:spPr>
+          <a:xfrm>
+            <a:off x="8687915" y="4939858"/>
+            <a:ext cx="1441269" cy="653716"/>
+          </a:xfrm>
+          <a:prstGeom prst="rect">
+            <a:avLst/>
+          </a:prstGeom>
+          <a:solidFill>
+            <a:srgbClr val="7030A0"/>
+          </a:solidFill>
+          <a:ln>
+            <a:noFill/>
+          </a:ln>
+        </p:spPr>
+        <p:style>
+          <a:lnRef idx="2">
+            <a:schemeClr val="accent1">
+              <a:shade val="50000"/>
+            </a:schemeClr>
+          </a:lnRef>
+          <a:fillRef idx="1">
+            <a:schemeClr val="accent1"/>
+          </a:fillRef>
+          <a:effectRef idx="0">
+            <a:schemeClr val="accent1"/>
+          </a:effectRef>
+          <a:fontRef idx="minor">
+            <a:schemeClr val="lt1"/>
+          </a:fontRef>
+        </p:style>
+        <p:txBody>
+          <a:bodyPr rtlCol="0" anchor="ctr"/>
+          <a:lstStyle/>
+          <a:p>
+            <a:pPr algn="ctr"/>
+            <a:r>
+              <a:rPr lang="pt-BR" b="1" dirty="0" smtClean="0">
+                <a:solidFill>
+                  <a:schemeClr val="bg1"/>
+                </a:solidFill>
+              </a:rPr>
+              <a:t>Armazenar dados</a:t>
+            </a:r>
+            <a:endParaRPr lang="pt-BR" b="1" dirty="0">
+              <a:solidFill>
+                <a:schemeClr val="bg1"/>
+              </a:solidFill>
+            </a:endParaRPr>
+          </a:p>
+        </p:txBody>
+      </p:sp>
+      <p:sp>
+        <p:nvSpPr>
+          <p:cNvPr id="32" name="Retângulo 31"/>
+          <p:cNvSpPr/>
+          <p:nvPr/>
+        </p:nvSpPr>
+        <p:spPr>
+          <a:xfrm>
+            <a:off x="2428356" y="2892654"/>
+            <a:ext cx="1441269" cy="653716"/>
+          </a:xfrm>
+          <a:prstGeom prst="rect">
+            <a:avLst/>
+          </a:prstGeom>
+          <a:solidFill>
+            <a:srgbClr val="7030A0"/>
+          </a:solidFill>
+          <a:ln>
+            <a:noFill/>
+          </a:ln>
+        </p:spPr>
+        <p:style>
+          <a:lnRef idx="2">
+            <a:schemeClr val="accent1">
+              <a:shade val="50000"/>
+            </a:schemeClr>
+          </a:lnRef>
+          <a:fillRef idx="1">
+            <a:schemeClr val="accent1"/>
+          </a:fillRef>
+          <a:effectRef idx="0">
+            <a:schemeClr val="accent1"/>
+          </a:effectRef>
+          <a:fontRef idx="minor">
+            <a:schemeClr val="lt1"/>
+          </a:fontRef>
+        </p:style>
+        <p:txBody>
+          <a:bodyPr rtlCol="0" anchor="ctr"/>
+          <a:lstStyle/>
+          <a:p>
+            <a:pPr algn="ctr"/>
+            <a:r>
+              <a:rPr lang="pt-BR" b="1" dirty="0" smtClean="0">
+                <a:solidFill>
+                  <a:schemeClr val="bg1"/>
+                </a:solidFill>
+              </a:rPr>
+              <a:t>Guardar dados</a:t>
+            </a:r>
+            <a:endParaRPr lang="pt-BR" b="1" dirty="0">
+              <a:solidFill>
+                <a:schemeClr val="bg1"/>
+              </a:solidFill>
+            </a:endParaRPr>
+          </a:p>
+        </p:txBody>
+      </p:sp>
+      <p:sp>
+        <p:nvSpPr>
+          <p:cNvPr id="33" name="Retângulo 32"/>
+          <p:cNvSpPr/>
+          <p:nvPr/>
+        </p:nvSpPr>
+        <p:spPr>
+          <a:xfrm>
+            <a:off x="4900131" y="4222801"/>
+            <a:ext cx="1441269" cy="653716"/>
+          </a:xfrm>
+          <a:prstGeom prst="rect">
+            <a:avLst/>
+          </a:prstGeom>
+          <a:solidFill>
+            <a:srgbClr val="7030A0"/>
+          </a:solidFill>
+          <a:ln>
+            <a:noFill/>
+          </a:ln>
+        </p:spPr>
+        <p:style>
+          <a:lnRef idx="2">
+            <a:schemeClr val="accent1">
+              <a:shade val="50000"/>
+            </a:schemeClr>
+          </a:lnRef>
+          <a:fillRef idx="1">
+            <a:schemeClr val="accent1"/>
+          </a:fillRef>
+          <a:effectRef idx="0">
+            <a:schemeClr val="accent1"/>
+          </a:effectRef>
+          <a:fontRef idx="minor">
+            <a:schemeClr val="lt1"/>
+          </a:fontRef>
+        </p:style>
+        <p:txBody>
+          <a:bodyPr rtlCol="0" anchor="ctr"/>
+          <a:lstStyle/>
+          <a:p>
+            <a:pPr algn="ctr"/>
+            <a:r>
+              <a:rPr lang="pt-BR" b="1" dirty="0" err="1" smtClean="0">
+                <a:solidFill>
+                  <a:schemeClr val="bg1"/>
+                </a:solidFill>
+              </a:rPr>
+              <a:t>Mysql</a:t>
+            </a:r>
+            <a:endParaRPr lang="pt-BR" b="1" dirty="0">
+              <a:solidFill>
+                <a:schemeClr val="bg1"/>
+              </a:solidFill>
+            </a:endParaRPr>
+          </a:p>
+        </p:txBody>
+      </p:sp>
+      <p:sp>
+        <p:nvSpPr>
+          <p:cNvPr id="34" name="Retângulo 33"/>
+          <p:cNvSpPr/>
+          <p:nvPr/>
+        </p:nvSpPr>
+        <p:spPr>
+          <a:xfrm>
+            <a:off x="5508508" y="5034413"/>
+            <a:ext cx="1441269" cy="653716"/>
+          </a:xfrm>
+          <a:prstGeom prst="rect">
+            <a:avLst/>
+          </a:prstGeom>
+          <a:solidFill>
+            <a:srgbClr val="7030A0"/>
+          </a:solidFill>
+          <a:ln>
+            <a:noFill/>
+          </a:ln>
+        </p:spPr>
+        <p:style>
+          <a:lnRef idx="2">
+            <a:schemeClr val="accent1">
+              <a:shade val="50000"/>
+            </a:schemeClr>
+          </a:lnRef>
+          <a:fillRef idx="1">
+            <a:schemeClr val="accent1"/>
+          </a:fillRef>
+          <a:effectRef idx="0">
+            <a:schemeClr val="accent1"/>
+          </a:effectRef>
+          <a:fontRef idx="minor">
+            <a:schemeClr val="lt1"/>
+          </a:fontRef>
+        </p:style>
+        <p:txBody>
+          <a:bodyPr rtlCol="0" anchor="ctr"/>
+          <a:lstStyle/>
+          <a:p>
+            <a:pPr algn="ctr"/>
+            <a:r>
+              <a:rPr lang="pt-BR" b="1" dirty="0" smtClean="0">
+                <a:solidFill>
+                  <a:schemeClr val="bg1"/>
+                </a:solidFill>
+              </a:rPr>
+              <a:t>Python</a:t>
+            </a:r>
+            <a:endParaRPr lang="pt-BR" b="1" dirty="0">
+              <a:solidFill>
+                <a:schemeClr val="bg1"/>
+              </a:solidFill>
+            </a:endParaRPr>
+          </a:p>
+        </p:txBody>
+      </p:sp>
+      <p:sp>
+        <p:nvSpPr>
+          <p:cNvPr id="35" name="Retângulo 34"/>
+          <p:cNvSpPr/>
+          <p:nvPr/>
+        </p:nvSpPr>
+        <p:spPr>
+          <a:xfrm>
+            <a:off x="5970022" y="3707638"/>
+            <a:ext cx="1771896" cy="653716"/>
+          </a:xfrm>
+          <a:prstGeom prst="rect">
+            <a:avLst/>
+          </a:prstGeom>
+          <a:solidFill>
+            <a:srgbClr val="7030A0"/>
+          </a:solidFill>
+          <a:ln>
+            <a:noFill/>
+          </a:ln>
+        </p:spPr>
+        <p:style>
+          <a:lnRef idx="2">
+            <a:schemeClr val="accent1">
+              <a:shade val="50000"/>
+            </a:schemeClr>
+          </a:lnRef>
+          <a:fillRef idx="1">
+            <a:schemeClr val="accent1"/>
+          </a:fillRef>
+          <a:effectRef idx="0">
+            <a:schemeClr val="accent1"/>
+          </a:effectRef>
+          <a:fontRef idx="minor">
+            <a:schemeClr val="lt1"/>
+          </a:fontRef>
+        </p:style>
+        <p:txBody>
+          <a:bodyPr rtlCol="0" anchor="ctr"/>
+          <a:lstStyle/>
+          <a:p>
+            <a:pPr algn="ctr"/>
+            <a:r>
+              <a:rPr lang="pt-BR" b="1" dirty="0" err="1" smtClean="0">
+                <a:solidFill>
+                  <a:schemeClr val="bg1"/>
+                </a:solidFill>
+              </a:rPr>
+              <a:t>Mysql.connector</a:t>
+            </a:r>
+            <a:endParaRPr lang="pt-BR" b="1" dirty="0">
+              <a:solidFill>
+                <a:schemeClr val="bg1"/>
+              </a:solidFill>
+            </a:endParaRPr>
+          </a:p>
+        </p:txBody>
+      </p:sp>
+      <p:sp>
+        <p:nvSpPr>
+          <p:cNvPr id="36" name="Retângulo 35"/>
+          <p:cNvSpPr/>
+          <p:nvPr/>
+        </p:nvSpPr>
+        <p:spPr>
+          <a:xfrm>
+            <a:off x="8838862" y="2822196"/>
+            <a:ext cx="1441269" cy="653716"/>
+          </a:xfrm>
+          <a:prstGeom prst="rect">
+            <a:avLst/>
+          </a:prstGeom>
+          <a:solidFill>
+            <a:schemeClr val="accent1"/>
+          </a:solidFill>
+          <a:ln>
+            <a:solidFill>
+              <a:schemeClr val="accent1"/>
+            </a:solidFill>
+          </a:ln>
+        </p:spPr>
+        <p:style>
+          <a:lnRef idx="2">
+            <a:schemeClr val="accent1">
+              <a:shade val="50000"/>
+            </a:schemeClr>
+          </a:lnRef>
+          <a:fillRef idx="1">
+            <a:schemeClr val="accent1"/>
+          </a:fillRef>
+          <a:effectRef idx="0">
+            <a:schemeClr val="accent1"/>
+          </a:effectRef>
+          <a:fontRef idx="minor">
+            <a:schemeClr val="lt1"/>
+          </a:fontRef>
+        </p:style>
+        <p:txBody>
+          <a:bodyPr rtlCol="0" anchor="ctr"/>
+          <a:lstStyle/>
+          <a:p>
+            <a:pPr algn="ctr"/>
+            <a:r>
+              <a:rPr lang="pt-BR" b="1" dirty="0" smtClean="0">
+                <a:solidFill>
+                  <a:schemeClr val="bg1"/>
+                </a:solidFill>
+              </a:rPr>
+              <a:t>Precisão dos dados</a:t>
+            </a:r>
+            <a:endParaRPr lang="pt-BR" b="1" dirty="0">
+              <a:solidFill>
+                <a:schemeClr val="bg1"/>
+              </a:solidFill>
+            </a:endParaRPr>
+          </a:p>
+        </p:txBody>
+      </p:sp>
+    </p:spTree>
+    <p:extLst>
+      <p:ext uri="{BB962C8B-B14F-4D97-AF65-F5344CB8AC3E}">
+        <p14:creationId xmlns:p14="http://schemas.microsoft.com/office/powerpoint/2010/main" val="1486929455"/>
       </p:ext>
     </p:extLst>
   </p:cSld>

</xml_diff>

<commit_message>
Planilha Backlog e Userstorys
</commit_message>
<xml_diff>
--- a/Projeto SIX MIND/Documentação/Lean UX Canva.pptx
+++ b/Projeto SIX MIND/Documentação/Lean UX Canva.pptx
@@ -250,7 +250,7 @@
           <a:p>
             <a:fld id="{3C9368B5-4CE7-416F-948F-D4F1A6F6C364}" type="datetimeFigureOut">
               <a:rPr lang="pt-BR" smtClean="0"/>
-              <a:t>07/09/2020</a:t>
+              <a:t>09/09/2020</a:t>
             </a:fld>
             <a:endParaRPr lang="pt-BR"/>
           </a:p>
@@ -420,7 +420,7 @@
           <a:p>
             <a:fld id="{3C9368B5-4CE7-416F-948F-D4F1A6F6C364}" type="datetimeFigureOut">
               <a:rPr lang="pt-BR" smtClean="0"/>
-              <a:t>07/09/2020</a:t>
+              <a:t>09/09/2020</a:t>
             </a:fld>
             <a:endParaRPr lang="pt-BR"/>
           </a:p>
@@ -600,7 +600,7 @@
           <a:p>
             <a:fld id="{3C9368B5-4CE7-416F-948F-D4F1A6F6C364}" type="datetimeFigureOut">
               <a:rPr lang="pt-BR" smtClean="0"/>
-              <a:t>07/09/2020</a:t>
+              <a:t>09/09/2020</a:t>
             </a:fld>
             <a:endParaRPr lang="pt-BR"/>
           </a:p>
@@ -770,7 +770,7 @@
           <a:p>
             <a:fld id="{3C9368B5-4CE7-416F-948F-D4F1A6F6C364}" type="datetimeFigureOut">
               <a:rPr lang="pt-BR" smtClean="0"/>
-              <a:t>07/09/2020</a:t>
+              <a:t>09/09/2020</a:t>
             </a:fld>
             <a:endParaRPr lang="pt-BR"/>
           </a:p>
@@ -1016,7 +1016,7 @@
           <a:p>
             <a:fld id="{3C9368B5-4CE7-416F-948F-D4F1A6F6C364}" type="datetimeFigureOut">
               <a:rPr lang="pt-BR" smtClean="0"/>
-              <a:t>07/09/2020</a:t>
+              <a:t>09/09/2020</a:t>
             </a:fld>
             <a:endParaRPr lang="pt-BR"/>
           </a:p>
@@ -1248,7 +1248,7 @@
           <a:p>
             <a:fld id="{3C9368B5-4CE7-416F-948F-D4F1A6F6C364}" type="datetimeFigureOut">
               <a:rPr lang="pt-BR" smtClean="0"/>
-              <a:t>07/09/2020</a:t>
+              <a:t>09/09/2020</a:t>
             </a:fld>
             <a:endParaRPr lang="pt-BR"/>
           </a:p>
@@ -1615,7 +1615,7 @@
           <a:p>
             <a:fld id="{3C9368B5-4CE7-416F-948F-D4F1A6F6C364}" type="datetimeFigureOut">
               <a:rPr lang="pt-BR" smtClean="0"/>
-              <a:t>07/09/2020</a:t>
+              <a:t>09/09/2020</a:t>
             </a:fld>
             <a:endParaRPr lang="pt-BR"/>
           </a:p>
@@ -1733,7 +1733,7 @@
           <a:p>
             <a:fld id="{3C9368B5-4CE7-416F-948F-D4F1A6F6C364}" type="datetimeFigureOut">
               <a:rPr lang="pt-BR" smtClean="0"/>
-              <a:t>07/09/2020</a:t>
+              <a:t>09/09/2020</a:t>
             </a:fld>
             <a:endParaRPr lang="pt-BR"/>
           </a:p>
@@ -1828,7 +1828,7 @@
           <a:p>
             <a:fld id="{3C9368B5-4CE7-416F-948F-D4F1A6F6C364}" type="datetimeFigureOut">
               <a:rPr lang="pt-BR" smtClean="0"/>
-              <a:t>07/09/2020</a:t>
+              <a:t>09/09/2020</a:t>
             </a:fld>
             <a:endParaRPr lang="pt-BR"/>
           </a:p>
@@ -2105,7 +2105,7 @@
           <a:p>
             <a:fld id="{3C9368B5-4CE7-416F-948F-D4F1A6F6C364}" type="datetimeFigureOut">
               <a:rPr lang="pt-BR" smtClean="0"/>
-              <a:t>07/09/2020</a:t>
+              <a:t>09/09/2020</a:t>
             </a:fld>
             <a:endParaRPr lang="pt-BR"/>
           </a:p>
@@ -2358,7 +2358,7 @@
           <a:p>
             <a:fld id="{3C9368B5-4CE7-416F-948F-D4F1A6F6C364}" type="datetimeFigureOut">
               <a:rPr lang="pt-BR" smtClean="0"/>
-              <a:t>07/09/2020</a:t>
+              <a:t>09/09/2020</a:t>
             </a:fld>
             <a:endParaRPr lang="pt-BR"/>
           </a:p>
@@ -2571,7 +2571,7 @@
           <a:p>
             <a:fld id="{3C9368B5-4CE7-416F-948F-D4F1A6F6C364}" type="datetimeFigureOut">
               <a:rPr lang="pt-BR" smtClean="0"/>
-              <a:t>07/09/2020</a:t>
+              <a:t>09/09/2020</a:t>
             </a:fld>
             <a:endParaRPr lang="pt-BR"/>
           </a:p>
@@ -11379,7 +11379,7 @@
         </p:nvSpPr>
         <p:spPr>
           <a:xfrm>
-            <a:off x="6096000" y="5493883"/>
+            <a:off x="6351176" y="5171418"/>
             <a:ext cx="1449977" cy="664595"/>
           </a:xfrm>
           <a:prstGeom prst="rect">
@@ -11952,6 +11952,64 @@
                 </a:solidFill>
               </a:rPr>
               <a:t>Dashboard</a:t>
+            </a:r>
+            <a:endParaRPr lang="pt-BR" b="1" dirty="0">
+              <a:solidFill>
+                <a:schemeClr val="bg1"/>
+              </a:solidFill>
+            </a:endParaRPr>
+          </a:p>
+        </p:txBody>
+      </p:sp>
+      <p:sp>
+        <p:nvSpPr>
+          <p:cNvPr id="34" name="Retângulo 33"/>
+          <p:cNvSpPr/>
+          <p:nvPr/>
+        </p:nvSpPr>
+        <p:spPr>
+          <a:xfrm>
+            <a:off x="4843302" y="5719022"/>
+            <a:ext cx="1449977" cy="664595"/>
+          </a:xfrm>
+          <a:prstGeom prst="rect">
+            <a:avLst/>
+          </a:prstGeom>
+          <a:solidFill>
+            <a:srgbClr val="70AD47"/>
+          </a:solidFill>
+          <a:ln>
+            <a:noFill/>
+          </a:ln>
+        </p:spPr>
+        <p:style>
+          <a:lnRef idx="2">
+            <a:schemeClr val="accent1">
+              <a:shade val="50000"/>
+            </a:schemeClr>
+          </a:lnRef>
+          <a:fillRef idx="1">
+            <a:schemeClr val="accent1"/>
+          </a:fillRef>
+          <a:effectRef idx="0">
+            <a:schemeClr val="accent1"/>
+          </a:effectRef>
+          <a:fontRef idx="minor">
+            <a:schemeClr val="lt1"/>
+          </a:fontRef>
+        </p:style>
+        <p:txBody>
+          <a:bodyPr rtlCol="0" anchor="ctr"/>
+          <a:lstStyle/>
+          <a:p>
+            <a:pPr algn="ctr"/>
+            <a:r>
+              <a:rPr lang="pt-BR" b="1" dirty="0" smtClean="0">
+                <a:solidFill>
+                  <a:schemeClr val="bg1"/>
+                </a:solidFill>
+              </a:rPr>
+              <a:t>Slack</a:t>
             </a:r>
             <a:endParaRPr lang="pt-BR" b="1" dirty="0">
               <a:solidFill>

</xml_diff>